<commit_message>
add bubble for chapter
</commit_message>
<xml_diff>
--- a/Documentation/Présentation/Présentation.pptx
+++ b/Documentation/Présentation/Présentation.pptx
@@ -6,6 +6,7 @@
   </p:sldMasterIdLst>
   <p:sldIdLst>
     <p:sldId id="256" r:id="rId2"/>
+    <p:sldId id="257" r:id="rId3"/>
   </p:sldIdLst>
   <p:sldSz cx="12192000" cy="6858000"/>
   <p:notesSz cx="6858000" cy="9144000"/>
@@ -156,7 +157,7 @@
           </a:lstStyle>
           <a:p>
             <a:r>
-              <a:rPr lang="fr-FR" dirty="0" smtClean="0"/>
+              <a:rPr lang="fr-FR" dirty="0"/>
               <a:t>Modifiez le style du titre</a:t>
             </a:r>
             <a:endParaRPr lang="fr-CH" dirty="0"/>
@@ -221,7 +222,7 @@
           </a:lstStyle>
           <a:p>
             <a:r>
-              <a:rPr lang="fr-FR" smtClean="0"/>
+              <a:rPr lang="fr-FR"/>
               <a:t>Modifiez le style des sous-titres du masque</a:t>
             </a:r>
             <a:endParaRPr lang="fr-CH"/>
@@ -339,7 +340,7 @@
           <a:lstStyle/>
           <a:p>
             <a:r>
-              <a:rPr lang="fr-FR" smtClean="0"/>
+              <a:rPr lang="fr-FR"/>
               <a:t>Modifiez le style du titre</a:t>
             </a:r>
             <a:endParaRPr lang="fr-CH"/>
@@ -363,35 +364,35 @@
           <a:p>
             <a:pPr lvl="0"/>
             <a:r>
-              <a:rPr lang="fr-FR" smtClean="0"/>
+              <a:rPr lang="fr-FR"/>
               <a:t>Modifiez les styles du texte du masque</a:t>
             </a:r>
           </a:p>
           <a:p>
             <a:pPr lvl="1"/>
             <a:r>
-              <a:rPr lang="fr-FR" smtClean="0"/>
+              <a:rPr lang="fr-FR"/>
               <a:t>Deuxième niveau</a:t>
             </a:r>
           </a:p>
           <a:p>
             <a:pPr lvl="2"/>
             <a:r>
-              <a:rPr lang="fr-FR" smtClean="0"/>
+              <a:rPr lang="fr-FR"/>
               <a:t>Troisième niveau</a:t>
             </a:r>
           </a:p>
           <a:p>
             <a:pPr lvl="3"/>
             <a:r>
-              <a:rPr lang="fr-FR" smtClean="0"/>
+              <a:rPr lang="fr-FR"/>
               <a:t>Quatrième niveau</a:t>
             </a:r>
           </a:p>
           <a:p>
             <a:pPr lvl="4"/>
             <a:r>
-              <a:rPr lang="fr-FR" smtClean="0"/>
+              <a:rPr lang="fr-FR"/>
               <a:t>Cinquième niveau</a:t>
             </a:r>
             <a:endParaRPr lang="fr-CH"/>
@@ -514,7 +515,7 @@
           <a:lstStyle/>
           <a:p>
             <a:r>
-              <a:rPr lang="fr-FR" smtClean="0"/>
+              <a:rPr lang="fr-FR"/>
               <a:t>Modifiez le style du titre</a:t>
             </a:r>
             <a:endParaRPr lang="fr-CH"/>
@@ -543,35 +544,35 @@
           <a:p>
             <a:pPr lvl="0"/>
             <a:r>
-              <a:rPr lang="fr-FR" smtClean="0"/>
+              <a:rPr lang="fr-FR"/>
               <a:t>Modifiez les styles du texte du masque</a:t>
             </a:r>
           </a:p>
           <a:p>
             <a:pPr lvl="1"/>
             <a:r>
-              <a:rPr lang="fr-FR" smtClean="0"/>
+              <a:rPr lang="fr-FR"/>
               <a:t>Deuxième niveau</a:t>
             </a:r>
           </a:p>
           <a:p>
             <a:pPr lvl="2"/>
             <a:r>
-              <a:rPr lang="fr-FR" smtClean="0"/>
+              <a:rPr lang="fr-FR"/>
               <a:t>Troisième niveau</a:t>
             </a:r>
           </a:p>
           <a:p>
             <a:pPr lvl="3"/>
             <a:r>
-              <a:rPr lang="fr-FR" smtClean="0"/>
+              <a:rPr lang="fr-FR"/>
               <a:t>Quatrième niveau</a:t>
             </a:r>
           </a:p>
           <a:p>
             <a:pPr lvl="4"/>
             <a:r>
-              <a:rPr lang="fr-FR" smtClean="0"/>
+              <a:rPr lang="fr-FR"/>
               <a:t>Cinquième niveau</a:t>
             </a:r>
             <a:endParaRPr lang="fr-CH"/>
@@ -689,7 +690,7 @@
           <a:lstStyle/>
           <a:p>
             <a:r>
-              <a:rPr lang="fr-FR" smtClean="0"/>
+              <a:rPr lang="fr-FR"/>
               <a:t>Modifiez le style du titre</a:t>
             </a:r>
             <a:endParaRPr lang="fr-CH"/>
@@ -713,35 +714,35 @@
           <a:p>
             <a:pPr lvl="0"/>
             <a:r>
-              <a:rPr lang="fr-FR" smtClean="0"/>
+              <a:rPr lang="fr-FR"/>
               <a:t>Modifiez les styles du texte du masque</a:t>
             </a:r>
           </a:p>
           <a:p>
             <a:pPr lvl="1"/>
             <a:r>
-              <a:rPr lang="fr-FR" smtClean="0"/>
+              <a:rPr lang="fr-FR"/>
               <a:t>Deuxième niveau</a:t>
             </a:r>
           </a:p>
           <a:p>
             <a:pPr lvl="2"/>
             <a:r>
-              <a:rPr lang="fr-FR" smtClean="0"/>
+              <a:rPr lang="fr-FR"/>
               <a:t>Troisième niveau</a:t>
             </a:r>
           </a:p>
           <a:p>
             <a:pPr lvl="3"/>
             <a:r>
-              <a:rPr lang="fr-FR" smtClean="0"/>
+              <a:rPr lang="fr-FR"/>
               <a:t>Quatrième niveau</a:t>
             </a:r>
           </a:p>
           <a:p>
             <a:pPr lvl="4"/>
             <a:r>
-              <a:rPr lang="fr-FR" smtClean="0"/>
+              <a:rPr lang="fr-FR"/>
               <a:t>Cinquième niveau</a:t>
             </a:r>
             <a:endParaRPr lang="fr-CH"/>
@@ -868,7 +869,7 @@
           </a:lstStyle>
           <a:p>
             <a:r>
-              <a:rPr lang="fr-FR" dirty="0" smtClean="0"/>
+              <a:rPr lang="fr-FR" dirty="0"/>
               <a:t>Modifiez le style du titre</a:t>
             </a:r>
             <a:endParaRPr lang="fr-CH" dirty="0"/>
@@ -988,7 +989,7 @@
           <a:p>
             <a:pPr lvl="0"/>
             <a:r>
-              <a:rPr lang="fr-FR" smtClean="0"/>
+              <a:rPr lang="fr-FR"/>
               <a:t>Modifiez les styles du texte du masque</a:t>
             </a:r>
           </a:p>
@@ -1105,7 +1106,7 @@
           <a:lstStyle/>
           <a:p>
             <a:r>
-              <a:rPr lang="fr-FR" smtClean="0"/>
+              <a:rPr lang="fr-FR"/>
               <a:t>Modifiez le style du titre</a:t>
             </a:r>
             <a:endParaRPr lang="fr-CH"/>
@@ -1134,35 +1135,35 @@
           <a:p>
             <a:pPr lvl="0"/>
             <a:r>
-              <a:rPr lang="fr-FR" smtClean="0"/>
+              <a:rPr lang="fr-FR"/>
               <a:t>Modifiez les styles du texte du masque</a:t>
             </a:r>
           </a:p>
           <a:p>
             <a:pPr lvl="1"/>
             <a:r>
-              <a:rPr lang="fr-FR" smtClean="0"/>
+              <a:rPr lang="fr-FR"/>
               <a:t>Deuxième niveau</a:t>
             </a:r>
           </a:p>
           <a:p>
             <a:pPr lvl="2"/>
             <a:r>
-              <a:rPr lang="fr-FR" smtClean="0"/>
+              <a:rPr lang="fr-FR"/>
               <a:t>Troisième niveau</a:t>
             </a:r>
           </a:p>
           <a:p>
             <a:pPr lvl="3"/>
             <a:r>
-              <a:rPr lang="fr-FR" smtClean="0"/>
+              <a:rPr lang="fr-FR"/>
               <a:t>Quatrième niveau</a:t>
             </a:r>
           </a:p>
           <a:p>
             <a:pPr lvl="4"/>
             <a:r>
-              <a:rPr lang="fr-FR" smtClean="0"/>
+              <a:rPr lang="fr-FR"/>
               <a:t>Cinquième niveau</a:t>
             </a:r>
             <a:endParaRPr lang="fr-CH"/>
@@ -1191,35 +1192,35 @@
           <a:p>
             <a:pPr lvl="0"/>
             <a:r>
-              <a:rPr lang="fr-FR" smtClean="0"/>
+              <a:rPr lang="fr-FR"/>
               <a:t>Modifiez les styles du texte du masque</a:t>
             </a:r>
           </a:p>
           <a:p>
             <a:pPr lvl="1"/>
             <a:r>
-              <a:rPr lang="fr-FR" smtClean="0"/>
+              <a:rPr lang="fr-FR"/>
               <a:t>Deuxième niveau</a:t>
             </a:r>
           </a:p>
           <a:p>
             <a:pPr lvl="2"/>
             <a:r>
-              <a:rPr lang="fr-FR" smtClean="0"/>
+              <a:rPr lang="fr-FR"/>
               <a:t>Troisième niveau</a:t>
             </a:r>
           </a:p>
           <a:p>
             <a:pPr lvl="3"/>
             <a:r>
-              <a:rPr lang="fr-FR" smtClean="0"/>
+              <a:rPr lang="fr-FR"/>
               <a:t>Quatrième niveau</a:t>
             </a:r>
           </a:p>
           <a:p>
             <a:pPr lvl="4"/>
             <a:r>
-              <a:rPr lang="fr-FR" smtClean="0"/>
+              <a:rPr lang="fr-FR"/>
               <a:t>Cinquième niveau</a:t>
             </a:r>
             <a:endParaRPr lang="fr-CH"/>
@@ -1342,7 +1343,7 @@
           <a:lstStyle/>
           <a:p>
             <a:r>
-              <a:rPr lang="fr-FR" smtClean="0"/>
+              <a:rPr lang="fr-FR"/>
               <a:t>Modifiez le style du titre</a:t>
             </a:r>
             <a:endParaRPr lang="fr-CH"/>
@@ -1408,7 +1409,7 @@
           <a:p>
             <a:pPr lvl="0"/>
             <a:r>
-              <a:rPr lang="fr-FR" smtClean="0"/>
+              <a:rPr lang="fr-FR"/>
               <a:t>Modifiez les styles du texte du masque</a:t>
             </a:r>
           </a:p>
@@ -1436,35 +1437,35 @@
           <a:p>
             <a:pPr lvl="0"/>
             <a:r>
-              <a:rPr lang="fr-FR" smtClean="0"/>
+              <a:rPr lang="fr-FR"/>
               <a:t>Modifiez les styles du texte du masque</a:t>
             </a:r>
           </a:p>
           <a:p>
             <a:pPr lvl="1"/>
             <a:r>
-              <a:rPr lang="fr-FR" smtClean="0"/>
+              <a:rPr lang="fr-FR"/>
               <a:t>Deuxième niveau</a:t>
             </a:r>
           </a:p>
           <a:p>
             <a:pPr lvl="2"/>
             <a:r>
-              <a:rPr lang="fr-FR" smtClean="0"/>
+              <a:rPr lang="fr-FR"/>
               <a:t>Troisième niveau</a:t>
             </a:r>
           </a:p>
           <a:p>
             <a:pPr lvl="3"/>
             <a:r>
-              <a:rPr lang="fr-FR" smtClean="0"/>
+              <a:rPr lang="fr-FR"/>
               <a:t>Quatrième niveau</a:t>
             </a:r>
           </a:p>
           <a:p>
             <a:pPr lvl="4"/>
             <a:r>
-              <a:rPr lang="fr-FR" smtClean="0"/>
+              <a:rPr lang="fr-FR"/>
               <a:t>Cinquième niveau</a:t>
             </a:r>
             <a:endParaRPr lang="fr-CH"/>
@@ -1530,7 +1531,7 @@
           <a:p>
             <a:pPr lvl="0"/>
             <a:r>
-              <a:rPr lang="fr-FR" smtClean="0"/>
+              <a:rPr lang="fr-FR"/>
               <a:t>Modifiez les styles du texte du masque</a:t>
             </a:r>
           </a:p>
@@ -1558,35 +1559,35 @@
           <a:p>
             <a:pPr lvl="0"/>
             <a:r>
-              <a:rPr lang="fr-FR" smtClean="0"/>
+              <a:rPr lang="fr-FR"/>
               <a:t>Modifiez les styles du texte du masque</a:t>
             </a:r>
           </a:p>
           <a:p>
             <a:pPr lvl="1"/>
             <a:r>
-              <a:rPr lang="fr-FR" smtClean="0"/>
+              <a:rPr lang="fr-FR"/>
               <a:t>Deuxième niveau</a:t>
             </a:r>
           </a:p>
           <a:p>
             <a:pPr lvl="2"/>
             <a:r>
-              <a:rPr lang="fr-FR" smtClean="0"/>
+              <a:rPr lang="fr-FR"/>
               <a:t>Troisième niveau</a:t>
             </a:r>
           </a:p>
           <a:p>
             <a:pPr lvl="3"/>
             <a:r>
-              <a:rPr lang="fr-FR" smtClean="0"/>
+              <a:rPr lang="fr-FR"/>
               <a:t>Quatrième niveau</a:t>
             </a:r>
           </a:p>
           <a:p>
             <a:pPr lvl="4"/>
             <a:r>
-              <a:rPr lang="fr-FR" smtClean="0"/>
+              <a:rPr lang="fr-FR"/>
               <a:t>Cinquième niveau</a:t>
             </a:r>
             <a:endParaRPr lang="fr-CH"/>
@@ -1704,7 +1705,7 @@
           <a:lstStyle/>
           <a:p>
             <a:r>
-              <a:rPr lang="fr-FR" smtClean="0"/>
+              <a:rPr lang="fr-FR"/>
               <a:t>Modifiez le style du titre</a:t>
             </a:r>
             <a:endParaRPr lang="fr-CH"/>
@@ -1926,7 +1927,7 @@
           </a:lstStyle>
           <a:p>
             <a:r>
-              <a:rPr lang="fr-FR" smtClean="0"/>
+              <a:rPr lang="fr-FR"/>
               <a:t>Modifiez le style du titre</a:t>
             </a:r>
             <a:endParaRPr lang="fr-CH"/>
@@ -1983,35 +1984,35 @@
           <a:p>
             <a:pPr lvl="0"/>
             <a:r>
-              <a:rPr lang="fr-FR" smtClean="0"/>
+              <a:rPr lang="fr-FR"/>
               <a:t>Modifiez les styles du texte du masque</a:t>
             </a:r>
           </a:p>
           <a:p>
             <a:pPr lvl="1"/>
             <a:r>
-              <a:rPr lang="fr-FR" smtClean="0"/>
+              <a:rPr lang="fr-FR"/>
               <a:t>Deuxième niveau</a:t>
             </a:r>
           </a:p>
           <a:p>
             <a:pPr lvl="2"/>
             <a:r>
-              <a:rPr lang="fr-FR" smtClean="0"/>
+              <a:rPr lang="fr-FR"/>
               <a:t>Troisième niveau</a:t>
             </a:r>
           </a:p>
           <a:p>
             <a:pPr lvl="3"/>
             <a:r>
-              <a:rPr lang="fr-FR" smtClean="0"/>
+              <a:rPr lang="fr-FR"/>
               <a:t>Quatrième niveau</a:t>
             </a:r>
           </a:p>
           <a:p>
             <a:pPr lvl="4"/>
             <a:r>
-              <a:rPr lang="fr-FR" smtClean="0"/>
+              <a:rPr lang="fr-FR"/>
               <a:t>Cinquième niveau</a:t>
             </a:r>
             <a:endParaRPr lang="fr-CH"/>
@@ -2077,7 +2078,7 @@
           <a:p>
             <a:pPr lvl="0"/>
             <a:r>
-              <a:rPr lang="fr-FR" smtClean="0"/>
+              <a:rPr lang="fr-FR"/>
               <a:t>Modifiez les styles du texte du masque</a:t>
             </a:r>
           </a:p>
@@ -2203,7 +2204,7 @@
           </a:lstStyle>
           <a:p>
             <a:r>
-              <a:rPr lang="fr-FR" smtClean="0"/>
+              <a:rPr lang="fr-FR"/>
               <a:t>Modifiez le style du titre</a:t>
             </a:r>
             <a:endParaRPr lang="fr-CH"/>
@@ -2330,7 +2331,7 @@
           <a:p>
             <a:pPr lvl="0"/>
             <a:r>
-              <a:rPr lang="fr-FR" smtClean="0"/>
+              <a:rPr lang="fr-FR"/>
               <a:t>Modifiez les styles du texte du masque</a:t>
             </a:r>
           </a:p>
@@ -2492,7 +2493,7 @@
           <a:lstStyle/>
           <a:p>
             <a:r>
-              <a:rPr lang="fr-FR" dirty="0" smtClean="0"/>
+              <a:rPr lang="fr-FR" dirty="0"/>
               <a:t>Modifiez le style du titre</a:t>
             </a:r>
             <a:endParaRPr lang="fr-CH" dirty="0"/>
@@ -2526,35 +2527,35 @@
           <a:p>
             <a:pPr lvl="0"/>
             <a:r>
-              <a:rPr lang="fr-FR" dirty="0" smtClean="0"/>
+              <a:rPr lang="fr-FR" dirty="0"/>
               <a:t>Modifiez les styles du texte du masque</a:t>
             </a:r>
           </a:p>
           <a:p>
             <a:pPr lvl="1"/>
             <a:r>
-              <a:rPr lang="fr-FR" dirty="0" smtClean="0"/>
+              <a:rPr lang="fr-FR" dirty="0"/>
               <a:t>Deuxième niveau</a:t>
             </a:r>
           </a:p>
           <a:p>
             <a:pPr lvl="2"/>
             <a:r>
-              <a:rPr lang="fr-FR" dirty="0" smtClean="0"/>
+              <a:rPr lang="fr-FR" dirty="0"/>
               <a:t>Troisième niveau</a:t>
             </a:r>
           </a:p>
           <a:p>
             <a:pPr lvl="3"/>
             <a:r>
-              <a:rPr lang="fr-FR" dirty="0" smtClean="0"/>
+              <a:rPr lang="fr-FR" dirty="0"/>
               <a:t>Quatrième niveau</a:t>
             </a:r>
           </a:p>
           <a:p>
             <a:pPr lvl="4"/>
             <a:r>
-              <a:rPr lang="fr-FR" dirty="0" smtClean="0"/>
+              <a:rPr lang="fr-FR" dirty="0"/>
               <a:t>Cinquième niveau</a:t>
             </a:r>
             <a:endParaRPr lang="fr-CH" dirty="0"/>
@@ -3017,11 +3018,11 @@
           <a:lstStyle/>
           <a:p>
             <a:r>
-              <a:rPr lang="fr-CH" dirty="0" smtClean="0"/>
+              <a:rPr lang="fr-CH" dirty="0"/>
               <a:t>Mini </a:t>
             </a:r>
             <a:r>
-              <a:rPr lang="fr-CH" dirty="0" err="1" smtClean="0"/>
+              <a:rPr lang="fr-CH" dirty="0" err="1"/>
               <a:t>games</a:t>
             </a:r>
             <a:endParaRPr lang="fr-CH" dirty="0"/>
@@ -3049,19 +3050,19 @@
           <a:lstStyle/>
           <a:p>
             <a:r>
-              <a:rPr lang="fr-CH" dirty="0" smtClean="0"/>
+              <a:rPr lang="fr-CH" dirty="0"/>
               <a:t>Marc Friedli, Anthony </a:t>
             </a:r>
             <a:r>
-              <a:rPr lang="fr-CH" dirty="0" err="1" smtClean="0"/>
+              <a:rPr lang="fr-CH" dirty="0" err="1"/>
               <a:t>gilloz</a:t>
             </a:r>
             <a:r>
-              <a:rPr lang="fr-CH" dirty="0" smtClean="0"/>
+              <a:rPr lang="fr-CH" dirty="0"/>
               <a:t>, Jonathan </a:t>
             </a:r>
             <a:r>
-              <a:rPr lang="fr-CH" dirty="0" err="1" smtClean="0"/>
+              <a:rPr lang="fr-CH" dirty="0" err="1"/>
               <a:t>guerne</a:t>
             </a:r>
             <a:endParaRPr lang="fr-CH" dirty="0"/>
@@ -3078,13 +3079,125 @@
   <p:clrMapOvr>
     <a:masterClrMapping/>
   </p:clrMapOvr>
-  <p:timing>
-    <p:tnLst>
-      <p:par>
-        <p:cTn id="1" dur="indefinite" restart="never" nodeType="tmRoot"/>
-      </p:par>
-    </p:tnLst>
-  </p:timing>
+</p:sld>
+</file>
+
+<file path=ppt/slides/slide2.xml><?xml version="1.0" encoding="utf-8"?>
+<p:sld xmlns:a="http://schemas.openxmlformats.org/drawingml/2006/main" xmlns:r="http://schemas.openxmlformats.org/officeDocument/2006/relationships" xmlns:p="http://schemas.openxmlformats.org/presentationml/2006/main">
+  <p:cSld>
+    <p:spTree>
+      <p:nvGrpSpPr>
+        <p:cNvPr id="1" name=""/>
+        <p:cNvGrpSpPr/>
+        <p:nvPr/>
+      </p:nvGrpSpPr>
+      <p:grpSpPr>
+        <a:xfrm>
+          <a:off x="0" y="0"/>
+          <a:ext cx="0" cy="0"/>
+          <a:chOff x="0" y="0"/>
+          <a:chExt cx="0" cy="0"/>
+        </a:xfrm>
+      </p:grpSpPr>
+      <p:sp>
+        <p:nvSpPr>
+          <p:cNvPr id="2" name="Titre 1"/>
+          <p:cNvSpPr>
+            <a:spLocks noGrp="1"/>
+          </p:cNvSpPr>
+          <p:nvPr>
+            <p:ph type="title"/>
+          </p:nvPr>
+        </p:nvSpPr>
+        <p:spPr/>
+        <p:txBody>
+          <a:bodyPr/>
+          <a:lstStyle/>
+          <a:p>
+            <a:endParaRPr lang="fr-CH" dirty="0"/>
+          </a:p>
+        </p:txBody>
+      </p:sp>
+      <p:sp>
+        <p:nvSpPr>
+          <p:cNvPr id="3" name="Espace réservé du contenu 2"/>
+          <p:cNvSpPr>
+            <a:spLocks noGrp="1"/>
+          </p:cNvSpPr>
+          <p:nvPr>
+            <p:ph idx="1"/>
+          </p:nvPr>
+        </p:nvSpPr>
+        <p:spPr/>
+        <p:txBody>
+          <a:bodyPr/>
+          <a:lstStyle/>
+          <a:p>
+            <a:endParaRPr lang="fr-CH" dirty="0"/>
+          </a:p>
+        </p:txBody>
+      </p:sp>
+      <p:sp>
+        <p:nvSpPr>
+          <p:cNvPr id="4" name="Bulle narrative : rectangle à coins arrondis 3"/>
+          <p:cNvSpPr/>
+          <p:nvPr/>
+        </p:nvSpPr>
+        <p:spPr>
+          <a:xfrm>
+            <a:off x="838200" y="365125"/>
+            <a:ext cx="5238509" cy="1325563"/>
+          </a:xfrm>
+          <a:prstGeom prst="wedgeRoundRectCallout">
+            <a:avLst>
+              <a:gd name="adj1" fmla="val -14204"/>
+              <a:gd name="adj2" fmla="val 75598"/>
+              <a:gd name="adj3" fmla="val 16667"/>
+            </a:avLst>
+          </a:prstGeom>
+          <a:ln w="57150"/>
+        </p:spPr>
+        <p:style>
+          <a:lnRef idx="2">
+            <a:schemeClr val="dk1"/>
+          </a:lnRef>
+          <a:fillRef idx="1">
+            <a:schemeClr val="lt1"/>
+          </a:fillRef>
+          <a:effectRef idx="0">
+            <a:schemeClr val="dk1"/>
+          </a:effectRef>
+          <a:fontRef idx="minor">
+            <a:schemeClr val="dk1"/>
+          </a:fontRef>
+        </p:style>
+        <p:txBody>
+          <a:bodyPr rtlCol="0" anchor="ctr"/>
+          <a:lstStyle/>
+          <a:p>
+            <a:pPr algn="ctr"/>
+            <a:r>
+              <a:rPr lang="fr-CH" sz="3200" dirty="0">
+                <a:latin typeface="Anime Ace 2.0 BB" panose="02000503000000020004" pitchFamily="2" charset="0"/>
+              </a:rPr>
+              <a:t>SOMMAIRE</a:t>
+            </a:r>
+            <a:endParaRPr lang="fr-CH" dirty="0">
+              <a:latin typeface="Anime Ace 2.0 BB" panose="02000503000000020004" pitchFamily="2" charset="0"/>
+            </a:endParaRPr>
+          </a:p>
+        </p:txBody>
+      </p:sp>
+    </p:spTree>
+    <p:extLst>
+      <p:ext uri="{BB962C8B-B14F-4D97-AF65-F5344CB8AC3E}">
+        <p14:creationId xmlns:p14="http://schemas.microsoft.com/office/powerpoint/2010/main" val="2364445497"/>
+      </p:ext>
+    </p:extLst>
+  </p:cSld>
+  <p:clrMapOvr>
+    <a:masterClrMapping/>
+  </p:clrMapOvr>
 </p:sld>
 </file>
 

</xml_diff>

<commit_message>
Modification of the presentation's template
</commit_message>
<xml_diff>
--- a/Documentation/Présentation/Présentation.pptx
+++ b/Documentation/Présentation/Présentation.pptx
@@ -7,6 +7,9 @@
   <p:sldIdLst>
     <p:sldId id="256" r:id="rId2"/>
     <p:sldId id="257" r:id="rId3"/>
+    <p:sldId id="258" r:id="rId4"/>
+    <p:sldId id="259" r:id="rId5"/>
+    <p:sldId id="260" r:id="rId6"/>
   </p:sldIdLst>
   <p:sldSz cx="12192000" cy="6858000"/>
   <p:notesSz cx="6858000" cy="9144000"/>
@@ -676,29 +679,6 @@
       </p:grpSpPr>
       <p:sp>
         <p:nvSpPr>
-          <p:cNvPr id="2" name="Titre 1"/>
-          <p:cNvSpPr>
-            <a:spLocks noGrp="1"/>
-          </p:cNvSpPr>
-          <p:nvPr>
-            <p:ph type="title"/>
-          </p:nvPr>
-        </p:nvSpPr>
-        <p:spPr/>
-        <p:txBody>
-          <a:bodyPr/>
-          <a:lstStyle/>
-          <a:p>
-            <a:r>
-              <a:rPr lang="fr-FR"/>
-              <a:t>Modifiez le style du titre</a:t>
-            </a:r>
-            <a:endParaRPr lang="fr-CH"/>
-          </a:p>
-        </p:txBody>
-      </p:sp>
-      <p:sp>
-        <p:nvSpPr>
           <p:cNvPr id="3" name="Espace réservé du contenu 2"/>
           <p:cNvSpPr>
             <a:spLocks noGrp="1"/>
@@ -810,6 +790,79 @@
               <a:rPr lang="fr-CH" smtClean="0"/>
               <a:t>‹N°›</a:t>
             </a:fld>
+            <a:endParaRPr lang="fr-CH"/>
+          </a:p>
+        </p:txBody>
+      </p:sp>
+      <p:sp>
+        <p:nvSpPr>
+          <p:cNvPr id="8" name="Bulle narrative : rectangle à coins arrondis 3"/>
+          <p:cNvSpPr/>
+          <p:nvPr userDrawn="1"/>
+        </p:nvSpPr>
+        <p:spPr>
+          <a:xfrm>
+            <a:off x="857491" y="365125"/>
+            <a:ext cx="5238509" cy="1325563"/>
+          </a:xfrm>
+          <a:prstGeom prst="wedgeRoundRectCallout">
+            <a:avLst>
+              <a:gd name="adj1" fmla="val -14204"/>
+              <a:gd name="adj2" fmla="val 75598"/>
+              <a:gd name="adj3" fmla="val 16667"/>
+            </a:avLst>
+          </a:prstGeom>
+          <a:ln w="57150"/>
+        </p:spPr>
+        <p:style>
+          <a:lnRef idx="2">
+            <a:schemeClr val="dk1"/>
+          </a:lnRef>
+          <a:fillRef idx="1">
+            <a:schemeClr val="lt1"/>
+          </a:fillRef>
+          <a:effectRef idx="0">
+            <a:schemeClr val="dk1"/>
+          </a:effectRef>
+          <a:fontRef idx="minor">
+            <a:schemeClr val="dk1"/>
+          </a:fontRef>
+        </p:style>
+        <p:txBody>
+          <a:bodyPr rtlCol="0" anchor="ctr"/>
+          <a:lstStyle/>
+          <a:p>
+            <a:pPr algn="ctr"/>
+            <a:endParaRPr lang="fr-CH" dirty="0">
+              <a:latin typeface="Anime Ace 2.0 BB" panose="02000503000000020004" pitchFamily="2" charset="0"/>
+            </a:endParaRPr>
+          </a:p>
+        </p:txBody>
+      </p:sp>
+      <p:sp>
+        <p:nvSpPr>
+          <p:cNvPr id="2" name="Titre 1"/>
+          <p:cNvSpPr>
+            <a:spLocks noGrp="1"/>
+          </p:cNvSpPr>
+          <p:nvPr>
+            <p:ph type="title"/>
+          </p:nvPr>
+        </p:nvSpPr>
+        <p:spPr>
+          <a:xfrm>
+            <a:off x="838201" y="365125"/>
+            <a:ext cx="5257800" cy="1325563"/>
+          </a:xfrm>
+        </p:spPr>
+        <p:txBody>
+          <a:bodyPr/>
+          <a:lstStyle/>
+          <a:p>
+            <a:r>
+              <a:rPr lang="fr-FR"/>
+              <a:t>Modifiez le style du titre</a:t>
+            </a:r>
             <a:endParaRPr lang="fr-CH"/>
           </a:p>
         </p:txBody>
@@ -1092,29 +1145,6 @@
       </p:grpSpPr>
       <p:sp>
         <p:nvSpPr>
-          <p:cNvPr id="2" name="Titre 1"/>
-          <p:cNvSpPr>
-            <a:spLocks noGrp="1"/>
-          </p:cNvSpPr>
-          <p:nvPr>
-            <p:ph type="title"/>
-          </p:nvPr>
-        </p:nvSpPr>
-        <p:spPr/>
-        <p:txBody>
-          <a:bodyPr/>
-          <a:lstStyle/>
-          <a:p>
-            <a:r>
-              <a:rPr lang="fr-FR"/>
-              <a:t>Modifiez le style du titre</a:t>
-            </a:r>
-            <a:endParaRPr lang="fr-CH"/>
-          </a:p>
-        </p:txBody>
-      </p:sp>
-      <p:sp>
-        <p:nvSpPr>
           <p:cNvPr id="3" name="Espace réservé du contenu 2"/>
           <p:cNvSpPr>
             <a:spLocks noGrp="1"/>
@@ -1288,6 +1318,74 @@
               <a:rPr lang="fr-CH" smtClean="0"/>
               <a:t>‹N°›</a:t>
             </a:fld>
+            <a:endParaRPr lang="fr-CH"/>
+          </a:p>
+        </p:txBody>
+      </p:sp>
+      <p:sp>
+        <p:nvSpPr>
+          <p:cNvPr id="9" name="Bulle narrative : rectangle à coins arrondis 3"/>
+          <p:cNvSpPr/>
+          <p:nvPr userDrawn="1"/>
+        </p:nvSpPr>
+        <p:spPr>
+          <a:xfrm>
+            <a:off x="857491" y="320675"/>
+            <a:ext cx="5238509" cy="1325563"/>
+          </a:xfrm>
+          <a:prstGeom prst="wedgeRoundRectCallout">
+            <a:avLst>
+              <a:gd name="adj1" fmla="val -14204"/>
+              <a:gd name="adj2" fmla="val 75598"/>
+              <a:gd name="adj3" fmla="val 16667"/>
+            </a:avLst>
+          </a:prstGeom>
+          <a:ln w="57150"/>
+        </p:spPr>
+        <p:style>
+          <a:lnRef idx="2">
+            <a:schemeClr val="dk1"/>
+          </a:lnRef>
+          <a:fillRef idx="1">
+            <a:schemeClr val="lt1"/>
+          </a:fillRef>
+          <a:effectRef idx="0">
+            <a:schemeClr val="dk1"/>
+          </a:effectRef>
+          <a:fontRef idx="minor">
+            <a:schemeClr val="dk1"/>
+          </a:fontRef>
+        </p:style>
+        <p:txBody>
+          <a:bodyPr rtlCol="0" anchor="ctr"/>
+          <a:lstStyle/>
+          <a:p>
+            <a:pPr algn="ctr"/>
+            <a:endParaRPr lang="fr-CH" dirty="0">
+              <a:latin typeface="Anime Ace 2.0 BB" panose="02000503000000020004" pitchFamily="2" charset="0"/>
+            </a:endParaRPr>
+          </a:p>
+        </p:txBody>
+      </p:sp>
+      <p:sp>
+        <p:nvSpPr>
+          <p:cNvPr id="2" name="Titre 1"/>
+          <p:cNvSpPr>
+            <a:spLocks noGrp="1"/>
+          </p:cNvSpPr>
+          <p:nvPr>
+            <p:ph type="title"/>
+          </p:nvPr>
+        </p:nvSpPr>
+        <p:spPr/>
+        <p:txBody>
+          <a:bodyPr/>
+          <a:lstStyle/>
+          <a:p>
+            <a:r>
+              <a:rPr lang="fr-FR"/>
+              <a:t>Modifiez le style du titre</a:t>
+            </a:r>
             <a:endParaRPr lang="fr-CH"/>
           </a:p>
         </p:txBody>
@@ -1691,29 +1789,6 @@
       </p:grpSpPr>
       <p:sp>
         <p:nvSpPr>
-          <p:cNvPr id="2" name="Titre 1"/>
-          <p:cNvSpPr>
-            <a:spLocks noGrp="1"/>
-          </p:cNvSpPr>
-          <p:nvPr>
-            <p:ph type="title"/>
-          </p:nvPr>
-        </p:nvSpPr>
-        <p:spPr/>
-        <p:txBody>
-          <a:bodyPr/>
-          <a:lstStyle/>
-          <a:p>
-            <a:r>
-              <a:rPr lang="fr-FR"/>
-              <a:t>Modifiez le style du titre</a:t>
-            </a:r>
-            <a:endParaRPr lang="fr-CH"/>
-          </a:p>
-        </p:txBody>
-      </p:sp>
-      <p:sp>
-        <p:nvSpPr>
           <p:cNvPr id="3" name="Espace réservé de la date 2"/>
           <p:cNvSpPr>
             <a:spLocks noGrp="1"/>
@@ -1773,6 +1848,74 @@
               <a:rPr lang="fr-CH" smtClean="0"/>
               <a:t>‹N°›</a:t>
             </a:fld>
+            <a:endParaRPr lang="fr-CH"/>
+          </a:p>
+        </p:txBody>
+      </p:sp>
+      <p:sp>
+        <p:nvSpPr>
+          <p:cNvPr id="6" name="Bulle narrative : rectangle à coins arrondis 3"/>
+          <p:cNvSpPr/>
+          <p:nvPr userDrawn="1"/>
+        </p:nvSpPr>
+        <p:spPr>
+          <a:xfrm>
+            <a:off x="857491" y="365125"/>
+            <a:ext cx="5238509" cy="1325563"/>
+          </a:xfrm>
+          <a:prstGeom prst="wedgeRoundRectCallout">
+            <a:avLst>
+              <a:gd name="adj1" fmla="val -14204"/>
+              <a:gd name="adj2" fmla="val 75598"/>
+              <a:gd name="adj3" fmla="val 16667"/>
+            </a:avLst>
+          </a:prstGeom>
+          <a:ln w="57150"/>
+        </p:spPr>
+        <p:style>
+          <a:lnRef idx="2">
+            <a:schemeClr val="dk1"/>
+          </a:lnRef>
+          <a:fillRef idx="1">
+            <a:schemeClr val="lt1"/>
+          </a:fillRef>
+          <a:effectRef idx="0">
+            <a:schemeClr val="dk1"/>
+          </a:effectRef>
+          <a:fontRef idx="minor">
+            <a:schemeClr val="dk1"/>
+          </a:fontRef>
+        </p:style>
+        <p:txBody>
+          <a:bodyPr rtlCol="0" anchor="ctr"/>
+          <a:lstStyle/>
+          <a:p>
+            <a:pPr algn="ctr"/>
+            <a:endParaRPr lang="fr-CH" dirty="0">
+              <a:latin typeface="Anime Ace 2.0 BB" panose="02000503000000020004" pitchFamily="2" charset="0"/>
+            </a:endParaRPr>
+          </a:p>
+        </p:txBody>
+      </p:sp>
+      <p:sp>
+        <p:nvSpPr>
+          <p:cNvPr id="2" name="Titre 1"/>
+          <p:cNvSpPr>
+            <a:spLocks noGrp="1"/>
+          </p:cNvSpPr>
+          <p:nvPr>
+            <p:ph type="title"/>
+          </p:nvPr>
+        </p:nvSpPr>
+        <p:spPr/>
+        <p:txBody>
+          <a:bodyPr/>
+          <a:lstStyle/>
+          <a:p>
+            <a:r>
+              <a:rPr lang="fr-FR"/>
+              <a:t>Modifiez le style du titre</a:t>
+            </a:r>
             <a:endParaRPr lang="fr-CH"/>
           </a:p>
         </p:txBody>
@@ -2469,39 +2612,6 @@
       </p:pic>
       <p:sp>
         <p:nvSpPr>
-          <p:cNvPr id="2" name="Espace réservé du titre 1"/>
-          <p:cNvSpPr>
-            <a:spLocks noGrp="1"/>
-          </p:cNvSpPr>
-          <p:nvPr>
-            <p:ph type="title"/>
-          </p:nvPr>
-        </p:nvSpPr>
-        <p:spPr>
-          <a:xfrm>
-            <a:off x="838200" y="365125"/>
-            <a:ext cx="10515600" cy="1325563"/>
-          </a:xfrm>
-          <a:prstGeom prst="rect">
-            <a:avLst/>
-          </a:prstGeom>
-        </p:spPr>
-        <p:txBody>
-          <a:bodyPr vert="horz" lIns="91440" tIns="45720" rIns="91440" bIns="45720" rtlCol="0" anchor="ctr">
-            <a:normAutofit/>
-          </a:bodyPr>
-          <a:lstStyle/>
-          <a:p>
-            <a:r>
-              <a:rPr lang="fr-FR" dirty="0"/>
-              <a:t>Modifiez le style du titre</a:t>
-            </a:r>
-            <a:endParaRPr lang="fr-CH" dirty="0"/>
-          </a:p>
-        </p:txBody>
-      </p:sp>
-      <p:sp>
-        <p:nvSpPr>
           <p:cNvPr id="3" name="Espace réservé du texte 2"/>
           <p:cNvSpPr>
             <a:spLocks noGrp="1"/>
@@ -2678,6 +2788,43 @@
               <a:t>‹N°›</a:t>
             </a:fld>
             <a:endParaRPr lang="fr-CH"/>
+          </a:p>
+        </p:txBody>
+      </p:sp>
+      <p:sp>
+        <p:nvSpPr>
+          <p:cNvPr id="2" name="Espace réservé du titre 1"/>
+          <p:cNvSpPr>
+            <a:spLocks noGrp="1"/>
+          </p:cNvSpPr>
+          <p:nvPr>
+            <p:ph type="title"/>
+          </p:nvPr>
+        </p:nvSpPr>
+        <p:spPr>
+          <a:xfrm>
+            <a:off x="838200" y="365125"/>
+            <a:ext cx="5238509" cy="1325563"/>
+          </a:xfrm>
+          <a:prstGeom prst="rect">
+            <a:avLst/>
+          </a:prstGeom>
+        </p:spPr>
+        <p:txBody>
+          <a:bodyPr vert="horz" lIns="91440" tIns="45720" rIns="91440" bIns="45720" rtlCol="0" anchor="ctr">
+            <a:normAutofit/>
+          </a:bodyPr>
+          <a:lstStyle/>
+          <a:p>
+            <a:r>
+              <a:rPr lang="fr-FR" dirty="0" smtClean="0"/>
+              <a:t>Modifiez le style du </a:t>
+            </a:r>
+            <a:r>
+              <a:rPr lang="fr-FR" dirty="0"/>
+              <a:t>titre</a:t>
+            </a:r>
+            <a:endParaRPr lang="fr-CH" dirty="0"/>
           </a:p>
         </p:txBody>
       </p:sp>
@@ -2712,7 +2859,7 @@
           <a:spcPct val="0"/>
         </a:spcBef>
         <a:buNone/>
-        <a:defRPr sz="4400" kern="1200">
+        <a:defRPr sz="3200" kern="1200">
           <a:solidFill>
             <a:schemeClr val="tx1"/>
           </a:solidFill>
@@ -3114,6 +3261,10 @@
           <a:bodyPr/>
           <a:lstStyle/>
           <a:p>
+            <a:r>
+              <a:rPr lang="fr-CH" dirty="0" smtClean="0"/>
+              <a:t>Sommaire</a:t>
+            </a:r>
             <a:endParaRPr lang="fr-CH" dirty="0"/>
           </a:p>
         </p:txBody>
@@ -3134,57 +3285,6 @@
           <a:lstStyle/>
           <a:p>
             <a:endParaRPr lang="fr-CH" dirty="0"/>
-          </a:p>
-        </p:txBody>
-      </p:sp>
-      <p:sp>
-        <p:nvSpPr>
-          <p:cNvPr id="4" name="Bulle narrative : rectangle à coins arrondis 3"/>
-          <p:cNvSpPr/>
-          <p:nvPr/>
-        </p:nvSpPr>
-        <p:spPr>
-          <a:xfrm>
-            <a:off x="838200" y="365125"/>
-            <a:ext cx="5238509" cy="1325563"/>
-          </a:xfrm>
-          <a:prstGeom prst="wedgeRoundRectCallout">
-            <a:avLst>
-              <a:gd name="adj1" fmla="val -14204"/>
-              <a:gd name="adj2" fmla="val 75598"/>
-              <a:gd name="adj3" fmla="val 16667"/>
-            </a:avLst>
-          </a:prstGeom>
-          <a:ln w="57150"/>
-        </p:spPr>
-        <p:style>
-          <a:lnRef idx="2">
-            <a:schemeClr val="dk1"/>
-          </a:lnRef>
-          <a:fillRef idx="1">
-            <a:schemeClr val="lt1"/>
-          </a:fillRef>
-          <a:effectRef idx="0">
-            <a:schemeClr val="dk1"/>
-          </a:effectRef>
-          <a:fontRef idx="minor">
-            <a:schemeClr val="dk1"/>
-          </a:fontRef>
-        </p:style>
-        <p:txBody>
-          <a:bodyPr rtlCol="0" anchor="ctr"/>
-          <a:lstStyle/>
-          <a:p>
-            <a:pPr algn="ctr"/>
-            <a:r>
-              <a:rPr lang="fr-CH" sz="3200" dirty="0">
-                <a:latin typeface="Anime Ace 2.0 BB" panose="02000503000000020004" pitchFamily="2" charset="0"/>
-              </a:rPr>
-              <a:t>SOMMAIRE</a:t>
-            </a:r>
-            <a:endParaRPr lang="fr-CH" dirty="0">
-              <a:latin typeface="Anime Ace 2.0 BB" panose="02000503000000020004" pitchFamily="2" charset="0"/>
-            </a:endParaRPr>
           </a:p>
         </p:txBody>
       </p:sp>
@@ -3192,6 +3292,267 @@
     <p:extLst>
       <p:ext uri="{BB962C8B-B14F-4D97-AF65-F5344CB8AC3E}">
         <p14:creationId xmlns:p14="http://schemas.microsoft.com/office/powerpoint/2010/main" val="2364445497"/>
+      </p:ext>
+    </p:extLst>
+  </p:cSld>
+  <p:clrMapOvr>
+    <a:masterClrMapping/>
+  </p:clrMapOvr>
+</p:sld>
+</file>
+
+<file path=ppt/slides/slide3.xml><?xml version="1.0" encoding="utf-8"?>
+<p:sld xmlns:a="http://schemas.openxmlformats.org/drawingml/2006/main" xmlns:r="http://schemas.openxmlformats.org/officeDocument/2006/relationships" xmlns:p="http://schemas.openxmlformats.org/presentationml/2006/main">
+  <p:cSld>
+    <p:spTree>
+      <p:nvGrpSpPr>
+        <p:cNvPr id="1" name=""/>
+        <p:cNvGrpSpPr/>
+        <p:nvPr/>
+      </p:nvGrpSpPr>
+      <p:grpSpPr>
+        <a:xfrm>
+          <a:off x="0" y="0"/>
+          <a:ext cx="0" cy="0"/>
+          <a:chOff x="0" y="0"/>
+          <a:chExt cx="0" cy="0"/>
+        </a:xfrm>
+      </p:grpSpPr>
+      <p:sp>
+        <p:nvSpPr>
+          <p:cNvPr id="2" name="Titre 1"/>
+          <p:cNvSpPr>
+            <a:spLocks noGrp="1"/>
+          </p:cNvSpPr>
+          <p:nvPr>
+            <p:ph type="title"/>
+          </p:nvPr>
+        </p:nvSpPr>
+        <p:spPr/>
+        <p:txBody>
+          <a:bodyPr/>
+          <a:lstStyle/>
+          <a:p>
+            <a:endParaRPr lang="fr-CH" dirty="0"/>
+          </a:p>
+        </p:txBody>
+      </p:sp>
+      <p:sp>
+        <p:nvSpPr>
+          <p:cNvPr id="3" name="Espace réservé du contenu 2"/>
+          <p:cNvSpPr>
+            <a:spLocks noGrp="1"/>
+          </p:cNvSpPr>
+          <p:nvPr>
+            <p:ph sz="half" idx="1"/>
+          </p:nvPr>
+        </p:nvSpPr>
+        <p:spPr/>
+        <p:txBody>
+          <a:bodyPr/>
+          <a:lstStyle/>
+          <a:p>
+            <a:endParaRPr lang="fr-CH" dirty="0"/>
+          </a:p>
+        </p:txBody>
+      </p:sp>
+      <p:sp>
+        <p:nvSpPr>
+          <p:cNvPr id="4" name="Espace réservé du contenu 3"/>
+          <p:cNvSpPr>
+            <a:spLocks noGrp="1"/>
+          </p:cNvSpPr>
+          <p:nvPr>
+            <p:ph sz="half" idx="2"/>
+          </p:nvPr>
+        </p:nvSpPr>
+        <p:spPr/>
+        <p:txBody>
+          <a:bodyPr/>
+          <a:lstStyle/>
+          <a:p>
+            <a:endParaRPr lang="fr-CH"/>
+          </a:p>
+        </p:txBody>
+      </p:sp>
+    </p:spTree>
+    <p:extLst>
+      <p:ext uri="{BB962C8B-B14F-4D97-AF65-F5344CB8AC3E}">
+        <p14:creationId xmlns:p14="http://schemas.microsoft.com/office/powerpoint/2010/main" val="2106188664"/>
+      </p:ext>
+    </p:extLst>
+  </p:cSld>
+  <p:clrMapOvr>
+    <a:masterClrMapping/>
+  </p:clrMapOvr>
+</p:sld>
+</file>
+
+<file path=ppt/slides/slide4.xml><?xml version="1.0" encoding="utf-8"?>
+<p:sld xmlns:a="http://schemas.openxmlformats.org/drawingml/2006/main" xmlns:r="http://schemas.openxmlformats.org/officeDocument/2006/relationships" xmlns:p="http://schemas.openxmlformats.org/presentationml/2006/main">
+  <p:cSld>
+    <p:spTree>
+      <p:nvGrpSpPr>
+        <p:cNvPr id="1" name=""/>
+        <p:cNvGrpSpPr/>
+        <p:nvPr/>
+      </p:nvGrpSpPr>
+      <p:grpSpPr>
+        <a:xfrm>
+          <a:off x="0" y="0"/>
+          <a:ext cx="0" cy="0"/>
+          <a:chOff x="0" y="0"/>
+          <a:chExt cx="0" cy="0"/>
+        </a:xfrm>
+      </p:grpSpPr>
+      <p:sp>
+        <p:nvSpPr>
+          <p:cNvPr id="2" name="Espace réservé du contenu 1"/>
+          <p:cNvSpPr>
+            <a:spLocks noGrp="1"/>
+          </p:cNvSpPr>
+          <p:nvPr>
+            <p:ph sz="half" idx="1"/>
+          </p:nvPr>
+        </p:nvSpPr>
+        <p:spPr/>
+        <p:txBody>
+          <a:bodyPr/>
+          <a:lstStyle/>
+          <a:p>
+            <a:endParaRPr lang="fr-CH"/>
+          </a:p>
+        </p:txBody>
+      </p:sp>
+      <p:sp>
+        <p:nvSpPr>
+          <p:cNvPr id="3" name="Espace réservé du contenu 2"/>
+          <p:cNvSpPr>
+            <a:spLocks noGrp="1"/>
+          </p:cNvSpPr>
+          <p:nvPr>
+            <p:ph sz="half" idx="2"/>
+          </p:nvPr>
+        </p:nvSpPr>
+        <p:spPr/>
+        <p:txBody>
+          <a:bodyPr/>
+          <a:lstStyle/>
+          <a:p>
+            <a:endParaRPr lang="fr-CH"/>
+          </a:p>
+        </p:txBody>
+      </p:sp>
+      <p:sp>
+        <p:nvSpPr>
+          <p:cNvPr id="4" name="Titre 3"/>
+          <p:cNvSpPr>
+            <a:spLocks noGrp="1"/>
+          </p:cNvSpPr>
+          <p:nvPr>
+            <p:ph type="title"/>
+          </p:nvPr>
+        </p:nvSpPr>
+        <p:spPr/>
+        <p:txBody>
+          <a:bodyPr/>
+          <a:lstStyle/>
+          <a:p>
+            <a:endParaRPr lang="fr-CH"/>
+          </a:p>
+        </p:txBody>
+      </p:sp>
+    </p:spTree>
+    <p:extLst>
+      <p:ext uri="{BB962C8B-B14F-4D97-AF65-F5344CB8AC3E}">
+        <p14:creationId xmlns:p14="http://schemas.microsoft.com/office/powerpoint/2010/main" val="3605192639"/>
+      </p:ext>
+    </p:extLst>
+  </p:cSld>
+  <p:clrMapOvr>
+    <a:masterClrMapping/>
+  </p:clrMapOvr>
+</p:sld>
+</file>
+
+<file path=ppt/slides/slide5.xml><?xml version="1.0" encoding="utf-8"?>
+<p:sld xmlns:a="http://schemas.openxmlformats.org/drawingml/2006/main" xmlns:r="http://schemas.openxmlformats.org/officeDocument/2006/relationships" xmlns:p="http://schemas.openxmlformats.org/presentationml/2006/main">
+  <p:cSld>
+    <p:spTree>
+      <p:nvGrpSpPr>
+        <p:cNvPr id="1" name=""/>
+        <p:cNvGrpSpPr/>
+        <p:nvPr/>
+      </p:nvGrpSpPr>
+      <p:grpSpPr>
+        <a:xfrm>
+          <a:off x="0" y="0"/>
+          <a:ext cx="0" cy="0"/>
+          <a:chOff x="0" y="0"/>
+          <a:chExt cx="0" cy="0"/>
+        </a:xfrm>
+      </p:grpSpPr>
+      <p:sp>
+        <p:nvSpPr>
+          <p:cNvPr id="2" name="Espace réservé du contenu 1"/>
+          <p:cNvSpPr>
+            <a:spLocks noGrp="1"/>
+          </p:cNvSpPr>
+          <p:nvPr>
+            <p:ph sz="half" idx="1"/>
+          </p:nvPr>
+        </p:nvSpPr>
+        <p:spPr/>
+        <p:txBody>
+          <a:bodyPr/>
+          <a:lstStyle/>
+          <a:p>
+            <a:endParaRPr lang="fr-CH"/>
+          </a:p>
+        </p:txBody>
+      </p:sp>
+      <p:sp>
+        <p:nvSpPr>
+          <p:cNvPr id="3" name="Espace réservé du contenu 2"/>
+          <p:cNvSpPr>
+            <a:spLocks noGrp="1"/>
+          </p:cNvSpPr>
+          <p:nvPr>
+            <p:ph sz="half" idx="2"/>
+          </p:nvPr>
+        </p:nvSpPr>
+        <p:spPr/>
+        <p:txBody>
+          <a:bodyPr/>
+          <a:lstStyle/>
+          <a:p>
+            <a:endParaRPr lang="fr-CH"/>
+          </a:p>
+        </p:txBody>
+      </p:sp>
+      <p:sp>
+        <p:nvSpPr>
+          <p:cNvPr id="4" name="Titre 3"/>
+          <p:cNvSpPr>
+            <a:spLocks noGrp="1"/>
+          </p:cNvSpPr>
+          <p:nvPr>
+            <p:ph type="title"/>
+          </p:nvPr>
+        </p:nvSpPr>
+        <p:spPr/>
+        <p:txBody>
+          <a:bodyPr/>
+          <a:lstStyle/>
+          <a:p>
+            <a:endParaRPr lang="fr-CH"/>
+          </a:p>
+        </p:txBody>
+      </p:sp>
+    </p:spTree>
+    <p:extLst>
+      <p:ext uri="{BB962C8B-B14F-4D97-AF65-F5344CB8AC3E}">
+        <p14:creationId xmlns:p14="http://schemas.microsoft.com/office/powerpoint/2010/main" val="2185482627"/>
       </p:ext>
     </p:extLst>
   </p:cSld>

</xml_diff>

<commit_message>
plouf is now transparent
</commit_message>
<xml_diff>
--- a/Documentation/Présentation/Présentation.pptx
+++ b/Documentation/Présentation/Présentation.pptx
@@ -13,9 +13,10 @@
     <p:sldId id="266" r:id="rId7"/>
     <p:sldId id="261" r:id="rId8"/>
     <p:sldId id="262" r:id="rId9"/>
-    <p:sldId id="263" r:id="rId10"/>
-    <p:sldId id="264" r:id="rId11"/>
-    <p:sldId id="265" r:id="rId12"/>
+    <p:sldId id="267" r:id="rId10"/>
+    <p:sldId id="263" r:id="rId11"/>
+    <p:sldId id="264" r:id="rId12"/>
+    <p:sldId id="265" r:id="rId13"/>
   </p:sldIdLst>
   <p:sldSz cx="12192000" cy="6858000"/>
   <p:notesSz cx="6858000" cy="9144000"/>
@@ -3250,6 +3251,135 @@
       </p:grpSpPr>
       <p:sp>
         <p:nvSpPr>
+          <p:cNvPr id="8" name="Explosion : 8 points 7"/>
+          <p:cNvSpPr/>
+          <p:nvPr/>
+        </p:nvSpPr>
+        <p:spPr>
+          <a:xfrm>
+            <a:off x="2752530" y="513184"/>
+            <a:ext cx="6671387" cy="5374432"/>
+          </a:xfrm>
+          <a:prstGeom prst="irregularSeal1">
+            <a:avLst/>
+          </a:prstGeom>
+          <a:solidFill>
+            <a:srgbClr val="FF0000"/>
+          </a:solidFill>
+          <a:ln w="57150">
+            <a:solidFill>
+              <a:schemeClr val="tx1"/>
+            </a:solidFill>
+          </a:ln>
+        </p:spPr>
+        <p:style>
+          <a:lnRef idx="2">
+            <a:schemeClr val="accent1">
+              <a:shade val="50000"/>
+            </a:schemeClr>
+          </a:lnRef>
+          <a:fillRef idx="1">
+            <a:schemeClr val="accent1"/>
+          </a:fillRef>
+          <a:effectRef idx="0">
+            <a:schemeClr val="accent1"/>
+          </a:effectRef>
+          <a:fontRef idx="minor">
+            <a:schemeClr val="lt1"/>
+          </a:fontRef>
+        </p:style>
+        <p:txBody>
+          <a:bodyPr rtlCol="0" anchor="ctr"/>
+          <a:lstStyle/>
+          <a:p>
+            <a:pPr algn="ctr"/>
+            <a:endParaRPr lang="fr-CH"/>
+          </a:p>
+        </p:txBody>
+      </p:sp>
+      <p:sp>
+        <p:nvSpPr>
+          <p:cNvPr id="7" name="ZoneTexte 6"/>
+          <p:cNvSpPr txBox="1"/>
+          <p:nvPr/>
+        </p:nvSpPr>
+        <p:spPr>
+          <a:xfrm>
+            <a:off x="0" y="1798845"/>
+            <a:ext cx="12192000" cy="2646878"/>
+          </a:xfrm>
+          <a:prstGeom prst="rect">
+            <a:avLst/>
+          </a:prstGeom>
+          <a:noFill/>
+        </p:spPr>
+        <p:txBody>
+          <a:bodyPr wrap="square" rtlCol="0">
+            <a:spAutoFit/>
+          </a:bodyPr>
+          <a:lstStyle/>
+          <a:p>
+            <a:pPr algn="ctr"/>
+            <a:r>
+              <a:rPr lang="fr-CH" sz="16600" b="1" dirty="0" err="1">
+                <a:ln w="57150">
+                  <a:solidFill>
+                    <a:schemeClr val="tx1"/>
+                  </a:solidFill>
+                </a:ln>
+                <a:solidFill>
+                  <a:schemeClr val="bg1"/>
+                </a:solidFill>
+                <a:latin typeface="Anime Ace 2.0 BB" panose="02000503000000020004" pitchFamily="2" charset="0"/>
+              </a:rPr>
+              <a:t>DéMO</a:t>
+            </a:r>
+            <a:endParaRPr lang="fr-CH" sz="16600" b="1" dirty="0">
+              <a:ln w="57150">
+                <a:solidFill>
+                  <a:schemeClr val="tx1"/>
+                </a:solidFill>
+              </a:ln>
+              <a:solidFill>
+                <a:schemeClr val="bg1"/>
+              </a:solidFill>
+              <a:latin typeface="Anime Ace 2.0 BB" panose="02000503000000020004" pitchFamily="2" charset="0"/>
+            </a:endParaRPr>
+          </a:p>
+        </p:txBody>
+      </p:sp>
+    </p:spTree>
+    <p:extLst>
+      <p:ext uri="{BB962C8B-B14F-4D97-AF65-F5344CB8AC3E}">
+        <p14:creationId xmlns:p14="http://schemas.microsoft.com/office/powerpoint/2010/main" val="4206619144"/>
+      </p:ext>
+    </p:extLst>
+  </p:cSld>
+  <p:clrMapOvr>
+    <a:masterClrMapping/>
+  </p:clrMapOvr>
+</p:sld>
+</file>
+
+<file path=ppt/slides/slide11.xml><?xml version="1.0" encoding="utf-8"?>
+<p:sld xmlns:a="http://schemas.openxmlformats.org/drawingml/2006/main" xmlns:r="http://schemas.openxmlformats.org/officeDocument/2006/relationships" xmlns:p="http://schemas.openxmlformats.org/presentationml/2006/main">
+  <p:cSld>
+    <p:spTree>
+      <p:nvGrpSpPr>
+        <p:cNvPr id="1" name=""/>
+        <p:cNvGrpSpPr/>
+        <p:nvPr/>
+      </p:nvGrpSpPr>
+      <p:grpSpPr>
+        <a:xfrm>
+          <a:off x="0" y="0"/>
+          <a:ext cx="0" cy="0"/>
+          <a:chOff x="0" y="0"/>
+          <a:chExt cx="0" cy="0"/>
+        </a:xfrm>
+      </p:grpSpPr>
+      <p:sp>
+        <p:nvSpPr>
           <p:cNvPr id="5" name="Espace réservé du contenu 4"/>
           <p:cNvSpPr>
             <a:spLocks noGrp="1"/>
@@ -3302,7 +3432,7 @@
 </p:sld>
 </file>
 
-<file path=ppt/slides/slide11.xml><?xml version="1.0" encoding="utf-8"?>
+<file path=ppt/slides/slide12.xml><?xml version="1.0" encoding="utf-8"?>
 <p:sld xmlns:a="http://schemas.openxmlformats.org/drawingml/2006/main" xmlns:r="http://schemas.openxmlformats.org/officeDocument/2006/relationships" xmlns:p="http://schemas.openxmlformats.org/presentationml/2006/main">
   <p:cSld>
     <p:spTree>
@@ -3414,7 +3544,7 @@
         <p:spPr/>
         <p:txBody>
           <a:bodyPr>
-            <a:normAutofit lnSpcReduction="10000"/>
+            <a:normAutofit fontScale="92500" lnSpcReduction="20000"/>
           </a:bodyPr>
           <a:lstStyle/>
           <a:p>
@@ -3454,6 +3584,12 @@
             <a:r>
               <a:rPr lang="fr-CH" dirty="0"/>
               <a:t>Bataille navale</a:t>
+            </a:r>
+          </a:p>
+          <a:p>
+            <a:r>
+              <a:rPr lang="fr-CH" dirty="0"/>
+              <a:t>Test et problèmes rencontrés</a:t>
             </a:r>
           </a:p>
           <a:p>
@@ -3713,7 +3849,7 @@
           <a:bodyPr/>
           <a:lstStyle/>
           <a:p>
-            <a:endParaRPr lang="fr-CH"/>
+            <a:endParaRPr lang="fr-CH" dirty="0"/>
           </a:p>
         </p:txBody>
       </p:sp>
@@ -3808,7 +3944,7 @@
             <a:pPr lvl="1"/>
             <a:r>
               <a:rPr lang="fr-CH" dirty="0"/>
-              <a:t>Envoie</a:t>
+              <a:t>Envoi</a:t>
             </a:r>
           </a:p>
           <a:p>
@@ -4247,107 +4383,73 @@
       </p:grpSpPr>
       <p:sp>
         <p:nvSpPr>
-          <p:cNvPr id="8" name="Explosion : 8 points 7"/>
-          <p:cNvSpPr/>
-          <p:nvPr/>
-        </p:nvSpPr>
-        <p:spPr>
-          <a:xfrm>
-            <a:off x="2752530" y="513184"/>
-            <a:ext cx="6671387" cy="5374432"/>
-          </a:xfrm>
-          <a:prstGeom prst="irregularSeal1">
-            <a:avLst/>
-          </a:prstGeom>
-          <a:solidFill>
-            <a:srgbClr val="FF0000"/>
-          </a:solidFill>
-          <a:ln w="57150">
-            <a:solidFill>
-              <a:schemeClr val="tx1"/>
-            </a:solidFill>
-          </a:ln>
-        </p:spPr>
-        <p:style>
-          <a:lnRef idx="2">
-            <a:schemeClr val="accent1">
-              <a:shade val="50000"/>
-            </a:schemeClr>
-          </a:lnRef>
-          <a:fillRef idx="1">
-            <a:schemeClr val="accent1"/>
-          </a:fillRef>
-          <a:effectRef idx="0">
-            <a:schemeClr val="accent1"/>
-          </a:effectRef>
-          <a:fontRef idx="minor">
-            <a:schemeClr val="lt1"/>
-          </a:fontRef>
-        </p:style>
-        <p:txBody>
-          <a:bodyPr rtlCol="0" anchor="ctr"/>
-          <a:lstStyle/>
-          <a:p>
-            <a:pPr algn="ctr"/>
-            <a:endParaRPr lang="fr-CH"/>
-          </a:p>
-        </p:txBody>
-      </p:sp>
-      <p:sp>
-        <p:nvSpPr>
-          <p:cNvPr id="7" name="ZoneTexte 6"/>
-          <p:cNvSpPr txBox="1"/>
-          <p:nvPr/>
-        </p:nvSpPr>
-        <p:spPr>
-          <a:xfrm>
-            <a:off x="0" y="1798845"/>
-            <a:ext cx="12192000" cy="2646878"/>
-          </a:xfrm>
-          <a:prstGeom prst="rect">
-            <a:avLst/>
-          </a:prstGeom>
-          <a:noFill/>
-        </p:spPr>
-        <p:txBody>
-          <a:bodyPr wrap="square" rtlCol="0">
-            <a:spAutoFit/>
+          <p:cNvPr id="2" name="Espace réservé du contenu 1"/>
+          <p:cNvSpPr>
+            <a:spLocks noGrp="1"/>
+          </p:cNvSpPr>
+          <p:nvPr>
+            <p:ph sz="half" idx="1"/>
+          </p:nvPr>
+        </p:nvSpPr>
+        <p:spPr/>
+        <p:txBody>
+          <a:bodyPr/>
+          <a:lstStyle/>
+          <a:p>
+            <a:endParaRPr lang="fr-CH" dirty="0"/>
+          </a:p>
+          <a:p>
+            <a:endParaRPr lang="fr-CH" dirty="0"/>
+          </a:p>
+        </p:txBody>
+      </p:sp>
+      <p:sp>
+        <p:nvSpPr>
+          <p:cNvPr id="3" name="Espace réservé du contenu 2"/>
+          <p:cNvSpPr>
+            <a:spLocks noGrp="1"/>
+          </p:cNvSpPr>
+          <p:nvPr>
+            <p:ph sz="half" idx="2"/>
+          </p:nvPr>
+        </p:nvSpPr>
+        <p:spPr/>
+        <p:txBody>
+          <a:bodyPr/>
+          <a:lstStyle/>
+          <a:p>
+            <a:endParaRPr lang="fr-CH" dirty="0"/>
+          </a:p>
+        </p:txBody>
+      </p:sp>
+      <p:sp>
+        <p:nvSpPr>
+          <p:cNvPr id="4" name="Titre 3"/>
+          <p:cNvSpPr>
+            <a:spLocks noGrp="1"/>
+          </p:cNvSpPr>
+          <p:nvPr>
+            <p:ph type="title"/>
+          </p:nvPr>
+        </p:nvSpPr>
+        <p:spPr/>
+        <p:txBody>
+          <a:bodyPr>
+            <a:normAutofit fontScale="90000"/>
           </a:bodyPr>
           <a:lstStyle/>
           <a:p>
-            <a:pPr algn="ctr"/>
-            <a:r>
-              <a:rPr lang="fr-CH" sz="16600" b="1" dirty="0" err="1">
-                <a:ln w="57150">
-                  <a:solidFill>
-                    <a:schemeClr val="tx1"/>
-                  </a:solidFill>
-                </a:ln>
-                <a:solidFill>
-                  <a:schemeClr val="bg1"/>
-                </a:solidFill>
-                <a:latin typeface="Anime Ace 2.0 BB" panose="02000503000000020004" pitchFamily="2" charset="0"/>
-              </a:rPr>
-              <a:t>DéMO</a:t>
-            </a:r>
-            <a:endParaRPr lang="fr-CH" sz="16600" b="1" dirty="0">
-              <a:ln w="57150">
-                <a:solidFill>
-                  <a:schemeClr val="tx1"/>
-                </a:solidFill>
-              </a:ln>
-              <a:solidFill>
-                <a:schemeClr val="bg1"/>
-              </a:solidFill>
-              <a:latin typeface="Anime Ace 2.0 BB" panose="02000503000000020004" pitchFamily="2" charset="0"/>
-            </a:endParaRPr>
+            <a:r>
+              <a:rPr lang="fr-CH" dirty="0"/>
+              <a:t>Tests et problèmes rencontrés</a:t>
+            </a:r>
           </a:p>
         </p:txBody>
       </p:sp>
     </p:spTree>
     <p:extLst>
       <p:ext uri="{BB962C8B-B14F-4D97-AF65-F5344CB8AC3E}">
-        <p14:creationId xmlns:p14="http://schemas.microsoft.com/office/powerpoint/2010/main" val="4206619144"/>
+        <p14:creationId xmlns:p14="http://schemas.microsoft.com/office/powerpoint/2010/main" val="2893650319"/>
       </p:ext>
     </p:extLst>
   </p:cSld>

</xml_diff>

<commit_message>
finalization of the battleship part in the report and add the battleship part in the presentation
</commit_message>
<xml_diff>
--- a/Documentation/Présentation/Présentation.pptx
+++ b/Documentation/Présentation/Présentation.pptx
@@ -4,6 +4,9 @@
   <p:sldMasterIdLst>
     <p:sldMasterId id="2147483648" r:id="rId1"/>
   </p:sldMasterIdLst>
+  <p:notesMasterIdLst>
+    <p:notesMasterId r:id="rId14"/>
+  </p:notesMasterIdLst>
   <p:sldIdLst>
     <p:sldId id="256" r:id="rId2"/>
     <p:sldId id="257" r:id="rId3"/>
@@ -121,6 +124,460 @@
     </p:ext>
   </p:extLst>
 </p:presentation>
+</file>
+
+<file path=ppt/notesMasters/notesMaster1.xml><?xml version="1.0" encoding="utf-8"?>
+<p:notesMaster xmlns:a="http://schemas.openxmlformats.org/drawingml/2006/main" xmlns:r="http://schemas.openxmlformats.org/officeDocument/2006/relationships" xmlns:p="http://schemas.openxmlformats.org/presentationml/2006/main">
+  <p:cSld>
+    <p:bg>
+      <p:bgRef idx="1001">
+        <a:schemeClr val="bg1"/>
+      </p:bgRef>
+    </p:bg>
+    <p:spTree>
+      <p:nvGrpSpPr>
+        <p:cNvPr id="1" name=""/>
+        <p:cNvGrpSpPr/>
+        <p:nvPr/>
+      </p:nvGrpSpPr>
+      <p:grpSpPr>
+        <a:xfrm>
+          <a:off x="0" y="0"/>
+          <a:ext cx="0" cy="0"/>
+          <a:chOff x="0" y="0"/>
+          <a:chExt cx="0" cy="0"/>
+        </a:xfrm>
+      </p:grpSpPr>
+      <p:sp>
+        <p:nvSpPr>
+          <p:cNvPr id="2" name="Espace réservé de l'en-tête 1"/>
+          <p:cNvSpPr>
+            <a:spLocks noGrp="1"/>
+          </p:cNvSpPr>
+          <p:nvPr>
+            <p:ph type="hdr" sz="quarter"/>
+          </p:nvPr>
+        </p:nvSpPr>
+        <p:spPr>
+          <a:xfrm>
+            <a:off x="0" y="0"/>
+            <a:ext cx="2971800" cy="458788"/>
+          </a:xfrm>
+          <a:prstGeom prst="rect">
+            <a:avLst/>
+          </a:prstGeom>
+        </p:spPr>
+        <p:txBody>
+          <a:bodyPr vert="horz" lIns="91440" tIns="45720" rIns="91440" bIns="45720" rtlCol="0"/>
+          <a:lstStyle>
+            <a:lvl1pPr algn="l">
+              <a:defRPr sz="1200"/>
+            </a:lvl1pPr>
+          </a:lstStyle>
+          <a:p>
+            <a:endParaRPr lang="fr-CH"/>
+          </a:p>
+        </p:txBody>
+      </p:sp>
+      <p:sp>
+        <p:nvSpPr>
+          <p:cNvPr id="3" name="Espace réservé de la date 2"/>
+          <p:cNvSpPr>
+            <a:spLocks noGrp="1"/>
+          </p:cNvSpPr>
+          <p:nvPr>
+            <p:ph type="dt" idx="1"/>
+          </p:nvPr>
+        </p:nvSpPr>
+        <p:spPr>
+          <a:xfrm>
+            <a:off x="3884613" y="0"/>
+            <a:ext cx="2971800" cy="458788"/>
+          </a:xfrm>
+          <a:prstGeom prst="rect">
+            <a:avLst/>
+          </a:prstGeom>
+        </p:spPr>
+        <p:txBody>
+          <a:bodyPr vert="horz" lIns="91440" tIns="45720" rIns="91440" bIns="45720" rtlCol="0"/>
+          <a:lstStyle>
+            <a:lvl1pPr algn="r">
+              <a:defRPr sz="1200"/>
+            </a:lvl1pPr>
+          </a:lstStyle>
+          <a:p>
+            <a:fld id="{F0C24D50-FE54-48BC-A4EB-B0617AB8095C}" type="datetimeFigureOut">
+              <a:rPr lang="fr-CH" smtClean="0"/>
+              <a:t>14.07.2017</a:t>
+            </a:fld>
+            <a:endParaRPr lang="fr-CH"/>
+          </a:p>
+        </p:txBody>
+      </p:sp>
+      <p:sp>
+        <p:nvSpPr>
+          <p:cNvPr id="4" name="Espace réservé de l'image des diapositives 3"/>
+          <p:cNvSpPr>
+            <a:spLocks noGrp="1" noRot="1" noChangeAspect="1"/>
+          </p:cNvSpPr>
+          <p:nvPr>
+            <p:ph type="sldImg" idx="2"/>
+          </p:nvPr>
+        </p:nvSpPr>
+        <p:spPr>
+          <a:xfrm>
+            <a:off x="685800" y="1143000"/>
+            <a:ext cx="5486400" cy="3086100"/>
+          </a:xfrm>
+          <a:prstGeom prst="rect">
+            <a:avLst/>
+          </a:prstGeom>
+          <a:noFill/>
+          <a:ln w="12700">
+            <a:solidFill>
+              <a:prstClr val="black"/>
+            </a:solidFill>
+          </a:ln>
+        </p:spPr>
+        <p:txBody>
+          <a:bodyPr vert="horz" lIns="91440" tIns="45720" rIns="91440" bIns="45720" rtlCol="0" anchor="ctr"/>
+          <a:lstStyle/>
+          <a:p>
+            <a:endParaRPr lang="fr-CH"/>
+          </a:p>
+        </p:txBody>
+      </p:sp>
+      <p:sp>
+        <p:nvSpPr>
+          <p:cNvPr id="5" name="Espace réservé des notes 4"/>
+          <p:cNvSpPr>
+            <a:spLocks noGrp="1"/>
+          </p:cNvSpPr>
+          <p:nvPr>
+            <p:ph type="body" sz="quarter" idx="3"/>
+          </p:nvPr>
+        </p:nvSpPr>
+        <p:spPr>
+          <a:xfrm>
+            <a:off x="685800" y="4400550"/>
+            <a:ext cx="5486400" cy="3600450"/>
+          </a:xfrm>
+          <a:prstGeom prst="rect">
+            <a:avLst/>
+          </a:prstGeom>
+        </p:spPr>
+        <p:txBody>
+          <a:bodyPr vert="horz" lIns="91440" tIns="45720" rIns="91440" bIns="45720" rtlCol="0"/>
+          <a:lstStyle/>
+          <a:p>
+            <a:pPr lvl="0"/>
+            <a:r>
+              <a:rPr lang="fr-FR"/>
+              <a:t>Modifier les styles du texte du masque</a:t>
+            </a:r>
+          </a:p>
+          <a:p>
+            <a:pPr lvl="1"/>
+            <a:r>
+              <a:rPr lang="fr-FR"/>
+              <a:t>Deuxième niveau</a:t>
+            </a:r>
+          </a:p>
+          <a:p>
+            <a:pPr lvl="2"/>
+            <a:r>
+              <a:rPr lang="fr-FR"/>
+              <a:t>Troisième niveau</a:t>
+            </a:r>
+          </a:p>
+          <a:p>
+            <a:pPr lvl="3"/>
+            <a:r>
+              <a:rPr lang="fr-FR"/>
+              <a:t>Quatrième niveau</a:t>
+            </a:r>
+          </a:p>
+          <a:p>
+            <a:pPr lvl="4"/>
+            <a:r>
+              <a:rPr lang="fr-FR"/>
+              <a:t>Cinquième niveau</a:t>
+            </a:r>
+            <a:endParaRPr lang="fr-CH"/>
+          </a:p>
+        </p:txBody>
+      </p:sp>
+      <p:sp>
+        <p:nvSpPr>
+          <p:cNvPr id="6" name="Espace réservé du pied de page 5"/>
+          <p:cNvSpPr>
+            <a:spLocks noGrp="1"/>
+          </p:cNvSpPr>
+          <p:nvPr>
+            <p:ph type="ftr" sz="quarter" idx="4"/>
+          </p:nvPr>
+        </p:nvSpPr>
+        <p:spPr>
+          <a:xfrm>
+            <a:off x="0" y="8685213"/>
+            <a:ext cx="2971800" cy="458787"/>
+          </a:xfrm>
+          <a:prstGeom prst="rect">
+            <a:avLst/>
+          </a:prstGeom>
+        </p:spPr>
+        <p:txBody>
+          <a:bodyPr vert="horz" lIns="91440" tIns="45720" rIns="91440" bIns="45720" rtlCol="0" anchor="b"/>
+          <a:lstStyle>
+            <a:lvl1pPr algn="l">
+              <a:defRPr sz="1200"/>
+            </a:lvl1pPr>
+          </a:lstStyle>
+          <a:p>
+            <a:endParaRPr lang="fr-CH"/>
+          </a:p>
+        </p:txBody>
+      </p:sp>
+      <p:sp>
+        <p:nvSpPr>
+          <p:cNvPr id="7" name="Espace réservé du numéro de diapositive 6"/>
+          <p:cNvSpPr>
+            <a:spLocks noGrp="1"/>
+          </p:cNvSpPr>
+          <p:nvPr>
+            <p:ph type="sldNum" sz="quarter" idx="5"/>
+          </p:nvPr>
+        </p:nvSpPr>
+        <p:spPr>
+          <a:xfrm>
+            <a:off x="3884613" y="8685213"/>
+            <a:ext cx="2971800" cy="458787"/>
+          </a:xfrm>
+          <a:prstGeom prst="rect">
+            <a:avLst/>
+          </a:prstGeom>
+        </p:spPr>
+        <p:txBody>
+          <a:bodyPr vert="horz" lIns="91440" tIns="45720" rIns="91440" bIns="45720" rtlCol="0" anchor="b"/>
+          <a:lstStyle>
+            <a:lvl1pPr algn="r">
+              <a:defRPr sz="1200"/>
+            </a:lvl1pPr>
+          </a:lstStyle>
+          <a:p>
+            <a:fld id="{175B7994-EFDA-45B3-8942-96357795C768}" type="slidenum">
+              <a:rPr lang="fr-CH" smtClean="0"/>
+              <a:t>‹N°›</a:t>
+            </a:fld>
+            <a:endParaRPr lang="fr-CH"/>
+          </a:p>
+        </p:txBody>
+      </p:sp>
+    </p:spTree>
+    <p:extLst>
+      <p:ext uri="{BB962C8B-B14F-4D97-AF65-F5344CB8AC3E}">
+        <p14:creationId xmlns:p14="http://schemas.microsoft.com/office/powerpoint/2010/main" val="2002612202"/>
+      </p:ext>
+    </p:extLst>
+  </p:cSld>
+  <p:clrMap bg1="lt1" tx1="dk1" bg2="lt2" tx2="dk2" accent1="accent1" accent2="accent2" accent3="accent3" accent4="accent4" accent5="accent5" accent6="accent6" hlink="hlink" folHlink="folHlink"/>
+  <p:notesStyle>
+    <a:lvl1pPr marL="0" algn="l" defTabSz="914400" rtl="0" eaLnBrk="1" latinLnBrk="0" hangingPunct="1">
+      <a:defRPr sz="1200" kern="1200">
+        <a:solidFill>
+          <a:schemeClr val="tx1"/>
+        </a:solidFill>
+        <a:latin typeface="+mn-lt"/>
+        <a:ea typeface="+mn-ea"/>
+        <a:cs typeface="+mn-cs"/>
+      </a:defRPr>
+    </a:lvl1pPr>
+    <a:lvl2pPr marL="457200" algn="l" defTabSz="914400" rtl="0" eaLnBrk="1" latinLnBrk="0" hangingPunct="1">
+      <a:defRPr sz="1200" kern="1200">
+        <a:solidFill>
+          <a:schemeClr val="tx1"/>
+        </a:solidFill>
+        <a:latin typeface="+mn-lt"/>
+        <a:ea typeface="+mn-ea"/>
+        <a:cs typeface="+mn-cs"/>
+      </a:defRPr>
+    </a:lvl2pPr>
+    <a:lvl3pPr marL="914400" algn="l" defTabSz="914400" rtl="0" eaLnBrk="1" latinLnBrk="0" hangingPunct="1">
+      <a:defRPr sz="1200" kern="1200">
+        <a:solidFill>
+          <a:schemeClr val="tx1"/>
+        </a:solidFill>
+        <a:latin typeface="+mn-lt"/>
+        <a:ea typeface="+mn-ea"/>
+        <a:cs typeface="+mn-cs"/>
+      </a:defRPr>
+    </a:lvl3pPr>
+    <a:lvl4pPr marL="1371600" algn="l" defTabSz="914400" rtl="0" eaLnBrk="1" latinLnBrk="0" hangingPunct="1">
+      <a:defRPr sz="1200" kern="1200">
+        <a:solidFill>
+          <a:schemeClr val="tx1"/>
+        </a:solidFill>
+        <a:latin typeface="+mn-lt"/>
+        <a:ea typeface="+mn-ea"/>
+        <a:cs typeface="+mn-cs"/>
+      </a:defRPr>
+    </a:lvl4pPr>
+    <a:lvl5pPr marL="1828800" algn="l" defTabSz="914400" rtl="0" eaLnBrk="1" latinLnBrk="0" hangingPunct="1">
+      <a:defRPr sz="1200" kern="1200">
+        <a:solidFill>
+          <a:schemeClr val="tx1"/>
+        </a:solidFill>
+        <a:latin typeface="+mn-lt"/>
+        <a:ea typeface="+mn-ea"/>
+        <a:cs typeface="+mn-cs"/>
+      </a:defRPr>
+    </a:lvl5pPr>
+    <a:lvl6pPr marL="2286000" algn="l" defTabSz="914400" rtl="0" eaLnBrk="1" latinLnBrk="0" hangingPunct="1">
+      <a:defRPr sz="1200" kern="1200">
+        <a:solidFill>
+          <a:schemeClr val="tx1"/>
+        </a:solidFill>
+        <a:latin typeface="+mn-lt"/>
+        <a:ea typeface="+mn-ea"/>
+        <a:cs typeface="+mn-cs"/>
+      </a:defRPr>
+    </a:lvl6pPr>
+    <a:lvl7pPr marL="2743200" algn="l" defTabSz="914400" rtl="0" eaLnBrk="1" latinLnBrk="0" hangingPunct="1">
+      <a:defRPr sz="1200" kern="1200">
+        <a:solidFill>
+          <a:schemeClr val="tx1"/>
+        </a:solidFill>
+        <a:latin typeface="+mn-lt"/>
+        <a:ea typeface="+mn-ea"/>
+        <a:cs typeface="+mn-cs"/>
+      </a:defRPr>
+    </a:lvl7pPr>
+    <a:lvl8pPr marL="3200400" algn="l" defTabSz="914400" rtl="0" eaLnBrk="1" latinLnBrk="0" hangingPunct="1">
+      <a:defRPr sz="1200" kern="1200">
+        <a:solidFill>
+          <a:schemeClr val="tx1"/>
+        </a:solidFill>
+        <a:latin typeface="+mn-lt"/>
+        <a:ea typeface="+mn-ea"/>
+        <a:cs typeface="+mn-cs"/>
+      </a:defRPr>
+    </a:lvl8pPr>
+    <a:lvl9pPr marL="3657600" algn="l" defTabSz="914400" rtl="0" eaLnBrk="1" latinLnBrk="0" hangingPunct="1">
+      <a:defRPr sz="1200" kern="1200">
+        <a:solidFill>
+          <a:schemeClr val="tx1"/>
+        </a:solidFill>
+        <a:latin typeface="+mn-lt"/>
+        <a:ea typeface="+mn-ea"/>
+        <a:cs typeface="+mn-cs"/>
+      </a:defRPr>
+    </a:lvl9pPr>
+  </p:notesStyle>
+</p:notesMaster>
+</file>
+
+<file path=ppt/notesSlides/notesSlide1.xml><?xml version="1.0" encoding="utf-8"?>
+<p:notes xmlns:a="http://schemas.openxmlformats.org/drawingml/2006/main" xmlns:r="http://schemas.openxmlformats.org/officeDocument/2006/relationships" xmlns:p="http://schemas.openxmlformats.org/presentationml/2006/main">
+  <p:cSld>
+    <p:spTree>
+      <p:nvGrpSpPr>
+        <p:cNvPr id="1" name=""/>
+        <p:cNvGrpSpPr/>
+        <p:nvPr/>
+      </p:nvGrpSpPr>
+      <p:grpSpPr>
+        <a:xfrm>
+          <a:off x="0" y="0"/>
+          <a:ext cx="0" cy="0"/>
+          <a:chOff x="0" y="0"/>
+          <a:chExt cx="0" cy="0"/>
+        </a:xfrm>
+      </p:grpSpPr>
+      <p:sp>
+        <p:nvSpPr>
+          <p:cNvPr id="2" name="Espace réservé de l'image des diapositives 1"/>
+          <p:cNvSpPr>
+            <a:spLocks noGrp="1" noRot="1" noChangeAspect="1"/>
+          </p:cNvSpPr>
+          <p:nvPr>
+            <p:ph type="sldImg"/>
+          </p:nvPr>
+        </p:nvSpPr>
+        <p:spPr/>
+      </p:sp>
+      <p:sp>
+        <p:nvSpPr>
+          <p:cNvPr id="3" name="Espace réservé des notes 2"/>
+          <p:cNvSpPr>
+            <a:spLocks noGrp="1"/>
+          </p:cNvSpPr>
+          <p:nvPr>
+            <p:ph type="body" idx="1"/>
+          </p:nvPr>
+        </p:nvSpPr>
+        <p:spPr/>
+        <p:txBody>
+          <a:bodyPr/>
+          <a:lstStyle/>
+          <a:p>
+            <a:r>
+              <a:rPr lang="fr-CH" dirty="0"/>
+              <a:t>Les différents</a:t>
+            </a:r>
+            <a:r>
+              <a:rPr lang="fr-CH" baseline="0" dirty="0"/>
+              <a:t> concept : 	Architecture client/serveur du cours de java</a:t>
+            </a:r>
+          </a:p>
+          <a:p>
+            <a:r>
+              <a:rPr lang="fr-CH" baseline="0" dirty="0"/>
+              <a:t>		Design pattern ??? (Je sais plus si on vraiment utilisé des pattern ou pas)</a:t>
+            </a:r>
+          </a:p>
+          <a:p>
+            <a:r>
+              <a:rPr lang="fr-CH" baseline="0" dirty="0"/>
+              <a:t>		</a:t>
+            </a:r>
+            <a:endParaRPr lang="fr-CH" dirty="0"/>
+          </a:p>
+        </p:txBody>
+      </p:sp>
+      <p:sp>
+        <p:nvSpPr>
+          <p:cNvPr id="4" name="Espace réservé du numéro de diapositive 3"/>
+          <p:cNvSpPr>
+            <a:spLocks noGrp="1"/>
+          </p:cNvSpPr>
+          <p:nvPr>
+            <p:ph type="sldNum" sz="quarter" idx="10"/>
+          </p:nvPr>
+        </p:nvSpPr>
+        <p:spPr/>
+        <p:txBody>
+          <a:bodyPr/>
+          <a:lstStyle/>
+          <a:p>
+            <a:fld id="{175B7994-EFDA-45B3-8942-96357795C768}" type="slidenum">
+              <a:rPr lang="fr-CH" smtClean="0"/>
+              <a:t>11</a:t>
+            </a:fld>
+            <a:endParaRPr lang="fr-CH"/>
+          </a:p>
+        </p:txBody>
+      </p:sp>
+    </p:spTree>
+    <p:extLst>
+      <p:ext uri="{BB962C8B-B14F-4D97-AF65-F5344CB8AC3E}">
+        <p14:creationId xmlns:p14="http://schemas.microsoft.com/office/powerpoint/2010/main" val="680921367"/>
+      </p:ext>
+    </p:extLst>
+  </p:cSld>
+  <p:clrMapOvr>
+    <a:masterClrMapping/>
+  </p:clrMapOvr>
+</p:notes>
 </file>
 
 <file path=ppt/slideLayouts/slideLayout1.xml><?xml version="1.0" encoding="utf-8"?>
@@ -3393,7 +3850,25 @@
           <a:bodyPr/>
           <a:lstStyle/>
           <a:p>
-            <a:endParaRPr lang="fr-CH"/>
+            <a:endParaRPr lang="fr-CH" dirty="0"/>
+          </a:p>
+          <a:p>
+            <a:r>
+              <a:rPr lang="fr-CH" dirty="0"/>
+              <a:t>Projet intéressant et mené à son terme</a:t>
+            </a:r>
+          </a:p>
+          <a:p>
+            <a:r>
+              <a:rPr lang="fr-CH" dirty="0"/>
+              <a:t>Mise en place des différents concepts</a:t>
+            </a:r>
+          </a:p>
+          <a:p>
+            <a:r>
+              <a:rPr lang="fr-CH" dirty="0"/>
+              <a:t>Découverte de nouvelles bibliothèques</a:t>
+            </a:r>
           </a:p>
         </p:txBody>
       </p:sp>
@@ -3429,6 +3904,186 @@
   <p:clrMapOvr>
     <a:masterClrMapping/>
   </p:clrMapOvr>
+  <p:timing>
+    <p:tnLst>
+      <p:par>
+        <p:cTn id="1" dur="indefinite" restart="never" nodeType="tmRoot">
+          <p:childTnLst>
+            <p:seq concurrent="1" nextAc="seek">
+              <p:cTn id="2" dur="indefinite" nodeType="mainSeq">
+                <p:childTnLst>
+                  <p:par>
+                    <p:cTn id="3" fill="hold">
+                      <p:stCondLst>
+                        <p:cond delay="indefinite"/>
+                      </p:stCondLst>
+                      <p:childTnLst>
+                        <p:par>
+                          <p:cTn id="4" fill="hold">
+                            <p:stCondLst>
+                              <p:cond delay="0"/>
+                            </p:stCondLst>
+                            <p:childTnLst>
+                              <p:par>
+                                <p:cTn id="5" presetID="1" presetClass="entr" presetSubtype="0" fill="hold" grpId="0" nodeType="clickEffect">
+                                  <p:stCondLst>
+                                    <p:cond delay="0"/>
+                                  </p:stCondLst>
+                                  <p:childTnLst>
+                                    <p:set>
+                                      <p:cBhvr>
+                                        <p:cTn id="6" dur="1" fill="hold">
+                                          <p:stCondLst>
+                                            <p:cond delay="0"/>
+                                          </p:stCondLst>
+                                        </p:cTn>
+                                        <p:tgtEl>
+                                          <p:spTgt spid="5">
+                                            <p:txEl>
+                                              <p:pRg st="1" end="1"/>
+                                            </p:txEl>
+                                          </p:spTgt>
+                                        </p:tgtEl>
+                                        <p:attrNameLst>
+                                          <p:attrName>style.visibility</p:attrName>
+                                        </p:attrNameLst>
+                                      </p:cBhvr>
+                                      <p:to>
+                                        <p:strVal val="visible"/>
+                                      </p:to>
+                                    </p:set>
+                                  </p:childTnLst>
+                                </p:cTn>
+                              </p:par>
+                            </p:childTnLst>
+                          </p:cTn>
+                        </p:par>
+                      </p:childTnLst>
+                    </p:cTn>
+                  </p:par>
+                  <p:par>
+                    <p:cTn id="7" fill="hold">
+                      <p:stCondLst>
+                        <p:cond delay="indefinite"/>
+                      </p:stCondLst>
+                      <p:childTnLst>
+                        <p:par>
+                          <p:cTn id="8" fill="hold">
+                            <p:stCondLst>
+                              <p:cond delay="0"/>
+                            </p:stCondLst>
+                            <p:childTnLst>
+                              <p:par>
+                                <p:cTn id="9" presetID="1" presetClass="entr" presetSubtype="0" fill="hold" grpId="0" nodeType="clickEffect">
+                                  <p:stCondLst>
+                                    <p:cond delay="0"/>
+                                  </p:stCondLst>
+                                  <p:childTnLst>
+                                    <p:set>
+                                      <p:cBhvr>
+                                        <p:cTn id="10" dur="1" fill="hold">
+                                          <p:stCondLst>
+                                            <p:cond delay="0"/>
+                                          </p:stCondLst>
+                                        </p:cTn>
+                                        <p:tgtEl>
+                                          <p:spTgt spid="5">
+                                            <p:txEl>
+                                              <p:pRg st="2" end="2"/>
+                                            </p:txEl>
+                                          </p:spTgt>
+                                        </p:tgtEl>
+                                        <p:attrNameLst>
+                                          <p:attrName>style.visibility</p:attrName>
+                                        </p:attrNameLst>
+                                      </p:cBhvr>
+                                      <p:to>
+                                        <p:strVal val="visible"/>
+                                      </p:to>
+                                    </p:set>
+                                  </p:childTnLst>
+                                </p:cTn>
+                              </p:par>
+                            </p:childTnLst>
+                          </p:cTn>
+                        </p:par>
+                      </p:childTnLst>
+                    </p:cTn>
+                  </p:par>
+                  <p:par>
+                    <p:cTn id="11" fill="hold">
+                      <p:stCondLst>
+                        <p:cond delay="indefinite"/>
+                      </p:stCondLst>
+                      <p:childTnLst>
+                        <p:par>
+                          <p:cTn id="12" fill="hold">
+                            <p:stCondLst>
+                              <p:cond delay="0"/>
+                            </p:stCondLst>
+                            <p:childTnLst>
+                              <p:par>
+                                <p:cTn id="13" presetID="1" presetClass="entr" presetSubtype="0" fill="hold" grpId="0" nodeType="clickEffect">
+                                  <p:stCondLst>
+                                    <p:cond delay="0"/>
+                                  </p:stCondLst>
+                                  <p:childTnLst>
+                                    <p:set>
+                                      <p:cBhvr>
+                                        <p:cTn id="14" dur="1" fill="hold">
+                                          <p:stCondLst>
+                                            <p:cond delay="0"/>
+                                          </p:stCondLst>
+                                        </p:cTn>
+                                        <p:tgtEl>
+                                          <p:spTgt spid="5">
+                                            <p:txEl>
+                                              <p:pRg st="3" end="3"/>
+                                            </p:txEl>
+                                          </p:spTgt>
+                                        </p:tgtEl>
+                                        <p:attrNameLst>
+                                          <p:attrName>style.visibility</p:attrName>
+                                        </p:attrNameLst>
+                                      </p:cBhvr>
+                                      <p:to>
+                                        <p:strVal val="visible"/>
+                                      </p:to>
+                                    </p:set>
+                                  </p:childTnLst>
+                                </p:cTn>
+                              </p:par>
+                            </p:childTnLst>
+                          </p:cTn>
+                        </p:par>
+                      </p:childTnLst>
+                    </p:cTn>
+                  </p:par>
+                </p:childTnLst>
+              </p:cTn>
+              <p:prevCondLst>
+                <p:cond evt="onPrev" delay="0">
+                  <p:tgtEl>
+                    <p:sldTgt/>
+                  </p:tgtEl>
+                </p:cond>
+              </p:prevCondLst>
+              <p:nextCondLst>
+                <p:cond evt="onNext" delay="0">
+                  <p:tgtEl>
+                    <p:sldTgt/>
+                  </p:tgtEl>
+                </p:cond>
+              </p:nextCondLst>
+            </p:seq>
+          </p:childTnLst>
+        </p:cTn>
+      </p:par>
+    </p:tnLst>
+    <p:bldLst>
+      <p:bldP spid="5" grpId="0" build="p"/>
+    </p:bldLst>
+  </p:timing>
 </p:sld>
 </file>
 
@@ -4308,27 +4963,61 @@
           <a:p>
             <a:endParaRPr lang="fr-CH" dirty="0"/>
           </a:p>
-        </p:txBody>
-      </p:sp>
-      <p:sp>
-        <p:nvSpPr>
-          <p:cNvPr id="3" name="Espace réservé du contenu 2"/>
-          <p:cNvSpPr>
-            <a:spLocks noGrp="1"/>
-          </p:cNvSpPr>
+          <a:p>
+            <a:r>
+              <a:rPr lang="fr-CH" dirty="0"/>
+              <a:t>Concept</a:t>
+            </a:r>
+          </a:p>
+          <a:p>
+            <a:r>
+              <a:rPr lang="fr-CH" dirty="0"/>
+              <a:t>Notre bataille navale</a:t>
+            </a:r>
+          </a:p>
+          <a:p>
+            <a:endParaRPr lang="fr-CH" dirty="0"/>
+          </a:p>
+          <a:p>
+            <a:endParaRPr lang="fr-CH" dirty="0"/>
+          </a:p>
+          <a:p>
+            <a:endParaRPr lang="fr-CH" dirty="0"/>
+          </a:p>
+          <a:p>
+            <a:endParaRPr lang="fr-CH" dirty="0"/>
+          </a:p>
+        </p:txBody>
+      </p:sp>
+      <p:pic>
+        <p:nvPicPr>
+          <p:cNvPr id="6" name="Espace réservé du contenu 5"/>
+          <p:cNvPicPr>
+            <a:picLocks noGrp="1" noChangeAspect="1"/>
+          </p:cNvPicPr>
           <p:nvPr>
             <p:ph sz="half" idx="2"/>
           </p:nvPr>
-        </p:nvSpPr>
-        <p:spPr/>
-        <p:txBody>
-          <a:bodyPr/>
-          <a:lstStyle/>
-          <a:p>
-            <a:endParaRPr lang="fr-CH"/>
-          </a:p>
-        </p:txBody>
-      </p:sp>
+        </p:nvPicPr>
+        <p:blipFill>
+          <a:blip r:embed="rId2">
+            <a:extLst>
+              <a:ext uri="{28A0092B-C50C-407E-A947-70E740481C1C}">
+                <a14:useLocalDpi xmlns:a14="http://schemas.microsoft.com/office/drawing/2010/main" val="0"/>
+              </a:ext>
+            </a:extLst>
+          </a:blip>
+          <a:stretch>
+            <a:fillRect/>
+          </a:stretch>
+        </p:blipFill>
+        <p:spPr>
+          <a:xfrm>
+            <a:off x="6610048" y="2360825"/>
+            <a:ext cx="4305901" cy="2467319"/>
+          </a:xfrm>
+        </p:spPr>
+      </p:pic>
       <p:sp>
         <p:nvSpPr>
           <p:cNvPr id="4" name="Titre 3"/>
@@ -4351,6 +5040,54 @@
           </a:p>
         </p:txBody>
       </p:sp>
+      <p:pic>
+        <p:nvPicPr>
+          <p:cNvPr id="7" name="Image 6"/>
+          <p:cNvPicPr>
+            <a:picLocks noChangeAspect="1"/>
+          </p:cNvPicPr>
+          <p:nvPr/>
+        </p:nvPicPr>
+        <p:blipFill>
+          <a:blip r:embed="rId3"/>
+          <a:stretch>
+            <a:fillRect/>
+          </a:stretch>
+        </p:blipFill>
+        <p:spPr>
+          <a:xfrm>
+            <a:off x="6393715" y="2148160"/>
+            <a:ext cx="4738566" cy="3706268"/>
+          </a:xfrm>
+          <a:prstGeom prst="rect">
+            <a:avLst/>
+          </a:prstGeom>
+        </p:spPr>
+      </p:pic>
+      <p:pic>
+        <p:nvPicPr>
+          <p:cNvPr id="10" name="Image 9"/>
+          <p:cNvPicPr>
+            <a:picLocks noChangeAspect="1"/>
+          </p:cNvPicPr>
+          <p:nvPr/>
+        </p:nvPicPr>
+        <p:blipFill>
+          <a:blip r:embed="rId4"/>
+          <a:stretch>
+            <a:fillRect/>
+          </a:stretch>
+        </p:blipFill>
+        <p:spPr>
+          <a:xfrm>
+            <a:off x="6393715" y="2148160"/>
+            <a:ext cx="4738566" cy="3706268"/>
+          </a:xfrm>
+          <a:prstGeom prst="rect">
+            <a:avLst/>
+          </a:prstGeom>
+        </p:spPr>
+      </p:pic>
     </p:spTree>
     <p:extLst>
       <p:ext uri="{BB962C8B-B14F-4D97-AF65-F5344CB8AC3E}">
@@ -4361,6 +5098,314 @@
   <p:clrMapOvr>
     <a:masterClrMapping/>
   </p:clrMapOvr>
+  <p:timing>
+    <p:tnLst>
+      <p:par>
+        <p:cTn id="1" dur="indefinite" restart="never" nodeType="tmRoot">
+          <p:childTnLst>
+            <p:seq concurrent="1" nextAc="seek">
+              <p:cTn id="2" dur="indefinite" nodeType="mainSeq">
+                <p:childTnLst>
+                  <p:par>
+                    <p:cTn id="3" fill="hold">
+                      <p:stCondLst>
+                        <p:cond delay="indefinite"/>
+                      </p:stCondLst>
+                      <p:childTnLst>
+                        <p:par>
+                          <p:cTn id="4" fill="hold">
+                            <p:stCondLst>
+                              <p:cond delay="0"/>
+                            </p:stCondLst>
+                            <p:childTnLst>
+                              <p:par>
+                                <p:cTn id="5" presetID="1" presetClass="entr" presetSubtype="0" fill="hold" grpId="0" nodeType="clickEffect">
+                                  <p:stCondLst>
+                                    <p:cond delay="0"/>
+                                  </p:stCondLst>
+                                  <p:childTnLst>
+                                    <p:set>
+                                      <p:cBhvr>
+                                        <p:cTn id="6" dur="1" fill="hold">
+                                          <p:stCondLst>
+                                            <p:cond delay="0"/>
+                                          </p:stCondLst>
+                                        </p:cTn>
+                                        <p:tgtEl>
+                                          <p:spTgt spid="2">
+                                            <p:txEl>
+                                              <p:pRg st="1" end="1"/>
+                                            </p:txEl>
+                                          </p:spTgt>
+                                        </p:tgtEl>
+                                        <p:attrNameLst>
+                                          <p:attrName>style.visibility</p:attrName>
+                                        </p:attrNameLst>
+                                      </p:cBhvr>
+                                      <p:to>
+                                        <p:strVal val="visible"/>
+                                      </p:to>
+                                    </p:set>
+                                  </p:childTnLst>
+                                </p:cTn>
+                              </p:par>
+                              <p:par>
+                                <p:cTn id="7" presetID="14" presetClass="entr" presetSubtype="10" fill="hold" nodeType="withEffect">
+                                  <p:stCondLst>
+                                    <p:cond delay="0"/>
+                                  </p:stCondLst>
+                                  <p:childTnLst>
+                                    <p:set>
+                                      <p:cBhvr>
+                                        <p:cTn id="8" dur="1" fill="hold">
+                                          <p:stCondLst>
+                                            <p:cond delay="0"/>
+                                          </p:stCondLst>
+                                        </p:cTn>
+                                        <p:tgtEl>
+                                          <p:spTgt spid="6"/>
+                                        </p:tgtEl>
+                                        <p:attrNameLst>
+                                          <p:attrName>style.visibility</p:attrName>
+                                        </p:attrNameLst>
+                                      </p:cBhvr>
+                                      <p:to>
+                                        <p:strVal val="visible"/>
+                                      </p:to>
+                                    </p:set>
+                                    <p:animEffect transition="in" filter="randombar(horizontal)">
+                                      <p:cBhvr>
+                                        <p:cTn id="9" dur="500"/>
+                                        <p:tgtEl>
+                                          <p:spTgt spid="6"/>
+                                        </p:tgtEl>
+                                      </p:cBhvr>
+                                    </p:animEffect>
+                                  </p:childTnLst>
+                                </p:cTn>
+                              </p:par>
+                            </p:childTnLst>
+                          </p:cTn>
+                        </p:par>
+                      </p:childTnLst>
+                    </p:cTn>
+                  </p:par>
+                  <p:par>
+                    <p:cTn id="10" fill="hold">
+                      <p:stCondLst>
+                        <p:cond delay="indefinite"/>
+                      </p:stCondLst>
+                      <p:childTnLst>
+                        <p:par>
+                          <p:cTn id="11" fill="hold">
+                            <p:stCondLst>
+                              <p:cond delay="0"/>
+                            </p:stCondLst>
+                            <p:childTnLst>
+                              <p:par>
+                                <p:cTn id="12" presetID="1" presetClass="entr" presetSubtype="0" fill="hold" grpId="0" nodeType="clickEffect">
+                                  <p:stCondLst>
+                                    <p:cond delay="0"/>
+                                  </p:stCondLst>
+                                  <p:childTnLst>
+                                    <p:set>
+                                      <p:cBhvr>
+                                        <p:cTn id="13" dur="1" fill="hold">
+                                          <p:stCondLst>
+                                            <p:cond delay="0"/>
+                                          </p:stCondLst>
+                                        </p:cTn>
+                                        <p:tgtEl>
+                                          <p:spTgt spid="2">
+                                            <p:txEl>
+                                              <p:pRg st="2" end="2"/>
+                                            </p:txEl>
+                                          </p:spTgt>
+                                        </p:tgtEl>
+                                        <p:attrNameLst>
+                                          <p:attrName>style.visibility</p:attrName>
+                                        </p:attrNameLst>
+                                      </p:cBhvr>
+                                      <p:to>
+                                        <p:strVal val="visible"/>
+                                      </p:to>
+                                    </p:set>
+                                  </p:childTnLst>
+                                </p:cTn>
+                              </p:par>
+                              <p:par>
+                                <p:cTn id="14" presetID="1" presetClass="exit" presetSubtype="0" fill="hold" nodeType="withEffect">
+                                  <p:stCondLst>
+                                    <p:cond delay="0"/>
+                                  </p:stCondLst>
+                                  <p:childTnLst>
+                                    <p:set>
+                                      <p:cBhvr>
+                                        <p:cTn id="15" dur="1" fill="hold">
+                                          <p:stCondLst>
+                                            <p:cond delay="0"/>
+                                          </p:stCondLst>
+                                        </p:cTn>
+                                        <p:tgtEl>
+                                          <p:spTgt spid="6"/>
+                                        </p:tgtEl>
+                                        <p:attrNameLst>
+                                          <p:attrName>style.visibility</p:attrName>
+                                        </p:attrNameLst>
+                                      </p:cBhvr>
+                                      <p:to>
+                                        <p:strVal val="hidden"/>
+                                      </p:to>
+                                    </p:set>
+                                  </p:childTnLst>
+                                </p:cTn>
+                              </p:par>
+                              <p:par>
+                                <p:cTn id="16" presetID="14" presetClass="entr" presetSubtype="10" fill="hold" nodeType="withEffect">
+                                  <p:stCondLst>
+                                    <p:cond delay="0"/>
+                                  </p:stCondLst>
+                                  <p:childTnLst>
+                                    <p:set>
+                                      <p:cBhvr>
+                                        <p:cTn id="17" dur="1" fill="hold">
+                                          <p:stCondLst>
+                                            <p:cond delay="0"/>
+                                          </p:stCondLst>
+                                        </p:cTn>
+                                        <p:tgtEl>
+                                          <p:spTgt spid="7"/>
+                                        </p:tgtEl>
+                                        <p:attrNameLst>
+                                          <p:attrName>style.visibility</p:attrName>
+                                        </p:attrNameLst>
+                                      </p:cBhvr>
+                                      <p:to>
+                                        <p:strVal val="visible"/>
+                                      </p:to>
+                                    </p:set>
+                                    <p:animEffect transition="in" filter="randombar(horizontal)">
+                                      <p:cBhvr>
+                                        <p:cTn id="18" dur="500"/>
+                                        <p:tgtEl>
+                                          <p:spTgt spid="7"/>
+                                        </p:tgtEl>
+                                      </p:cBhvr>
+                                    </p:animEffect>
+                                  </p:childTnLst>
+                                </p:cTn>
+                              </p:par>
+                            </p:childTnLst>
+                          </p:cTn>
+                        </p:par>
+                      </p:childTnLst>
+                    </p:cTn>
+                  </p:par>
+                  <p:par>
+                    <p:cTn id="19" fill="hold">
+                      <p:stCondLst>
+                        <p:cond delay="indefinite"/>
+                      </p:stCondLst>
+                      <p:childTnLst>
+                        <p:par>
+                          <p:cTn id="20" fill="hold">
+                            <p:stCondLst>
+                              <p:cond delay="0"/>
+                            </p:stCondLst>
+                            <p:childTnLst>
+                              <p:par>
+                                <p:cTn id="21" presetID="14" presetClass="entr" presetSubtype="10" fill="hold" nodeType="clickEffect">
+                                  <p:stCondLst>
+                                    <p:cond delay="0"/>
+                                  </p:stCondLst>
+                                  <p:childTnLst>
+                                    <p:set>
+                                      <p:cBhvr>
+                                        <p:cTn id="22" dur="1" fill="hold">
+                                          <p:stCondLst>
+                                            <p:cond delay="0"/>
+                                          </p:stCondLst>
+                                        </p:cTn>
+                                        <p:tgtEl>
+                                          <p:spTgt spid="10"/>
+                                        </p:tgtEl>
+                                        <p:attrNameLst>
+                                          <p:attrName>style.visibility</p:attrName>
+                                        </p:attrNameLst>
+                                      </p:cBhvr>
+                                      <p:to>
+                                        <p:strVal val="visible"/>
+                                      </p:to>
+                                    </p:set>
+                                    <p:animEffect transition="in" filter="randombar(horizontal)">
+                                      <p:cBhvr>
+                                        <p:cTn id="23" dur="500"/>
+                                        <p:tgtEl>
+                                          <p:spTgt spid="10"/>
+                                        </p:tgtEl>
+                                      </p:cBhvr>
+                                    </p:animEffect>
+                                  </p:childTnLst>
+                                </p:cTn>
+                              </p:par>
+                              <p:par>
+                                <p:cTn id="24" presetID="1" presetClass="exit" presetSubtype="0" fill="hold" nodeType="withEffect">
+                                  <p:stCondLst>
+                                    <p:cond delay="0"/>
+                                  </p:stCondLst>
+                                  <p:childTnLst>
+                                    <p:set>
+                                      <p:cBhvr>
+                                        <p:cTn id="25" dur="1" fill="hold">
+                                          <p:stCondLst>
+                                            <p:cond delay="0"/>
+                                          </p:stCondLst>
+                                        </p:cTn>
+                                        <p:tgtEl>
+                                          <p:spTgt spid="7"/>
+                                        </p:tgtEl>
+                                        <p:attrNameLst>
+                                          <p:attrName>style.visibility</p:attrName>
+                                        </p:attrNameLst>
+                                      </p:cBhvr>
+                                      <p:to>
+                                        <p:strVal val="hidden"/>
+                                      </p:to>
+                                    </p:set>
+                                  </p:childTnLst>
+                                </p:cTn>
+                              </p:par>
+                            </p:childTnLst>
+                          </p:cTn>
+                        </p:par>
+                      </p:childTnLst>
+                    </p:cTn>
+                  </p:par>
+                </p:childTnLst>
+              </p:cTn>
+              <p:prevCondLst>
+                <p:cond evt="onPrev" delay="0">
+                  <p:tgtEl>
+                    <p:sldTgt/>
+                  </p:tgtEl>
+                </p:cond>
+              </p:prevCondLst>
+              <p:nextCondLst>
+                <p:cond evt="onNext" delay="0">
+                  <p:tgtEl>
+                    <p:sldTgt/>
+                  </p:tgtEl>
+                </p:cond>
+              </p:nextCondLst>
+            </p:seq>
+          </p:childTnLst>
+        </p:cTn>
+      </p:par>
+    </p:tnLst>
+    <p:bldLst>
+      <p:bldP spid="2" grpId="0" uiExpand="1" build="p"/>
+    </p:bldLst>
+  </p:timing>
 </p:sld>
 </file>
 
@@ -4399,6 +5444,12 @@
             <a:endParaRPr lang="fr-CH" dirty="0"/>
           </a:p>
           <a:p>
+            <a:r>
+              <a:rPr lang="fr-CH" dirty="0"/>
+              <a:t>Problème lors de la déconnexion de la bataille navale</a:t>
+            </a:r>
+          </a:p>
+          <a:p>
             <a:endParaRPr lang="fr-CH" dirty="0"/>
           </a:p>
         </p:txBody>
@@ -4435,7 +5486,7 @@
         <p:spPr/>
         <p:txBody>
           <a:bodyPr>
-            <a:normAutofit fontScale="90000"/>
+            <a:normAutofit/>
           </a:bodyPr>
           <a:lstStyle/>
           <a:p>
@@ -4718,4 +5769,299 @@
     </a:ext>
   </a:extLst>
 </a:theme>
+</file>
+
+<file path=ppt/theme/theme2.xml><?xml version="1.0" encoding="utf-8"?>
+<a:theme xmlns:a="http://schemas.openxmlformats.org/drawingml/2006/main" name="Thème Office">
+  <a:themeElements>
+    <a:clrScheme name="Office">
+      <a:dk1>
+        <a:sysClr val="windowText" lastClr="000000"/>
+      </a:dk1>
+      <a:lt1>
+        <a:sysClr val="window" lastClr="FFFFFF"/>
+      </a:lt1>
+      <a:dk2>
+        <a:srgbClr val="44546A"/>
+      </a:dk2>
+      <a:lt2>
+        <a:srgbClr val="E7E6E6"/>
+      </a:lt2>
+      <a:accent1>
+        <a:srgbClr val="4472C4"/>
+      </a:accent1>
+      <a:accent2>
+        <a:srgbClr val="ED7D31"/>
+      </a:accent2>
+      <a:accent3>
+        <a:srgbClr val="A5A5A5"/>
+      </a:accent3>
+      <a:accent4>
+        <a:srgbClr val="FFC000"/>
+      </a:accent4>
+      <a:accent5>
+        <a:srgbClr val="5B9BD5"/>
+      </a:accent5>
+      <a:accent6>
+        <a:srgbClr val="70AD47"/>
+      </a:accent6>
+      <a:hlink>
+        <a:srgbClr val="0563C1"/>
+      </a:hlink>
+      <a:folHlink>
+        <a:srgbClr val="954F72"/>
+      </a:folHlink>
+    </a:clrScheme>
+    <a:fontScheme name="Office">
+      <a:majorFont>
+        <a:latin typeface="Calibri Light" panose="020F0302020204030204"/>
+        <a:ea typeface=""/>
+        <a:cs typeface=""/>
+        <a:font script="Jpan" typeface="游ゴシック Light"/>
+        <a:font script="Hang" typeface="맑은 고딕"/>
+        <a:font script="Hans" typeface="等线 Light"/>
+        <a:font script="Hant" typeface="新細明體"/>
+        <a:font script="Arab" typeface="Times New Roman"/>
+        <a:font script="Hebr" typeface="Times New Roman"/>
+        <a:font script="Thai" typeface="Angsana New"/>
+        <a:font script="Ethi" typeface="Nyala"/>
+        <a:font script="Beng" typeface="Vrinda"/>
+        <a:font script="Gujr" typeface="Shruti"/>
+        <a:font script="Khmr" typeface="MoolBoran"/>
+        <a:font script="Knda" typeface="Tunga"/>
+        <a:font script="Guru" typeface="Raavi"/>
+        <a:font script="Cans" typeface="Euphemia"/>
+        <a:font script="Cher" typeface="Plantagenet Cherokee"/>
+        <a:font script="Yiii" typeface="Microsoft Yi Baiti"/>
+        <a:font script="Tibt" typeface="Microsoft Himalaya"/>
+        <a:font script="Thaa" typeface="MV Boli"/>
+        <a:font script="Deva" typeface="Mangal"/>
+        <a:font script="Telu" typeface="Gautami"/>
+        <a:font script="Taml" typeface="Latha"/>
+        <a:font script="Syrc" typeface="Estrangelo Edessa"/>
+        <a:font script="Orya" typeface="Kalinga"/>
+        <a:font script="Mlym" typeface="Kartika"/>
+        <a:font script="Laoo" typeface="DokChampa"/>
+        <a:font script="Sinh" typeface="Iskoola Pota"/>
+        <a:font script="Mong" typeface="Mongolian Baiti"/>
+        <a:font script="Viet" typeface="Times New Roman"/>
+        <a:font script="Uigh" typeface="Microsoft Uighur"/>
+        <a:font script="Geor" typeface="Sylfaen"/>
+        <a:font script="Armn" typeface="Arial"/>
+        <a:font script="Bugi" typeface="Leelawadee UI"/>
+        <a:font script="Bopo" typeface="Microsoft JhengHei"/>
+        <a:font script="Java" typeface="Javanese Text"/>
+        <a:font script="Lisu" typeface="Segoe UI"/>
+        <a:font script="Mymr" typeface="Myanmar Text"/>
+        <a:font script="Nkoo" typeface="Ebrima"/>
+        <a:font script="Olck" typeface="Nirmala UI"/>
+        <a:font script="Osma" typeface="Ebrima"/>
+        <a:font script="Phag" typeface="Phagspa"/>
+        <a:font script="Syrn" typeface="Estrangelo Edessa"/>
+        <a:font script="Syrj" typeface="Estrangelo Edessa"/>
+        <a:font script="Syre" typeface="Estrangelo Edessa"/>
+        <a:font script="Sora" typeface="Nirmala UI"/>
+        <a:font script="Tale" typeface="Microsoft Tai Le"/>
+        <a:font script="Talu" typeface="Microsoft New Tai Lue"/>
+        <a:font script="Tfng" typeface="Ebrima"/>
+      </a:majorFont>
+      <a:minorFont>
+        <a:latin typeface="Calibri" panose="020F0502020204030204"/>
+        <a:ea typeface=""/>
+        <a:cs typeface=""/>
+        <a:font script="Jpan" typeface="游ゴシック"/>
+        <a:font script="Hang" typeface="맑은 고딕"/>
+        <a:font script="Hans" typeface="等线"/>
+        <a:font script="Hant" typeface="新細明體"/>
+        <a:font script="Arab" typeface="Arial"/>
+        <a:font script="Hebr" typeface="Arial"/>
+        <a:font script="Thai" typeface="Cordia New"/>
+        <a:font script="Ethi" typeface="Nyala"/>
+        <a:font script="Beng" typeface="Vrinda"/>
+        <a:font script="Gujr" typeface="Shruti"/>
+        <a:font script="Khmr" typeface="DaunPenh"/>
+        <a:font script="Knda" typeface="Tunga"/>
+        <a:font script="Guru" typeface="Raavi"/>
+        <a:font script="Cans" typeface="Euphemia"/>
+        <a:font script="Cher" typeface="Plantagenet Cherokee"/>
+        <a:font script="Yiii" typeface="Microsoft Yi Baiti"/>
+        <a:font script="Tibt" typeface="Microsoft Himalaya"/>
+        <a:font script="Thaa" typeface="MV Boli"/>
+        <a:font script="Deva" typeface="Mangal"/>
+        <a:font script="Telu" typeface="Gautami"/>
+        <a:font script="Taml" typeface="Latha"/>
+        <a:font script="Syrc" typeface="Estrangelo Edessa"/>
+        <a:font script="Orya" typeface="Kalinga"/>
+        <a:font script="Mlym" typeface="Kartika"/>
+        <a:font script="Laoo" typeface="DokChampa"/>
+        <a:font script="Sinh" typeface="Iskoola Pota"/>
+        <a:font script="Mong" typeface="Mongolian Baiti"/>
+        <a:font script="Viet" typeface="Arial"/>
+        <a:font script="Uigh" typeface="Microsoft Uighur"/>
+        <a:font script="Geor" typeface="Sylfaen"/>
+        <a:font script="Armn" typeface="Arial"/>
+        <a:font script="Bugi" typeface="Leelawadee UI"/>
+        <a:font script="Bopo" typeface="Microsoft JhengHei"/>
+        <a:font script="Java" typeface="Javanese Text"/>
+        <a:font script="Lisu" typeface="Segoe UI"/>
+        <a:font script="Mymr" typeface="Myanmar Text"/>
+        <a:font script="Nkoo" typeface="Ebrima"/>
+        <a:font script="Olck" typeface="Nirmala UI"/>
+        <a:font script="Osma" typeface="Ebrima"/>
+        <a:font script="Phag" typeface="Phagspa"/>
+        <a:font script="Syrn" typeface="Estrangelo Edessa"/>
+        <a:font script="Syrj" typeface="Estrangelo Edessa"/>
+        <a:font script="Syre" typeface="Estrangelo Edessa"/>
+        <a:font script="Sora" typeface="Nirmala UI"/>
+        <a:font script="Tale" typeface="Microsoft Tai Le"/>
+        <a:font script="Talu" typeface="Microsoft New Tai Lue"/>
+        <a:font script="Tfng" typeface="Ebrima"/>
+      </a:minorFont>
+    </a:fontScheme>
+    <a:fmtScheme name="Office">
+      <a:fillStyleLst>
+        <a:solidFill>
+          <a:schemeClr val="phClr"/>
+        </a:solidFill>
+        <a:gradFill rotWithShape="1">
+          <a:gsLst>
+            <a:gs pos="0">
+              <a:schemeClr val="phClr">
+                <a:lumMod val="110000"/>
+                <a:satMod val="105000"/>
+                <a:tint val="67000"/>
+              </a:schemeClr>
+            </a:gs>
+            <a:gs pos="50000">
+              <a:schemeClr val="phClr">
+                <a:lumMod val="105000"/>
+                <a:satMod val="103000"/>
+                <a:tint val="73000"/>
+              </a:schemeClr>
+            </a:gs>
+            <a:gs pos="100000">
+              <a:schemeClr val="phClr">
+                <a:lumMod val="105000"/>
+                <a:satMod val="109000"/>
+                <a:tint val="81000"/>
+              </a:schemeClr>
+            </a:gs>
+          </a:gsLst>
+          <a:lin ang="5400000" scaled="0"/>
+        </a:gradFill>
+        <a:gradFill rotWithShape="1">
+          <a:gsLst>
+            <a:gs pos="0">
+              <a:schemeClr val="phClr">
+                <a:satMod val="103000"/>
+                <a:lumMod val="102000"/>
+                <a:tint val="94000"/>
+              </a:schemeClr>
+            </a:gs>
+            <a:gs pos="50000">
+              <a:schemeClr val="phClr">
+                <a:satMod val="110000"/>
+                <a:lumMod val="100000"/>
+                <a:shade val="100000"/>
+              </a:schemeClr>
+            </a:gs>
+            <a:gs pos="100000">
+              <a:schemeClr val="phClr">
+                <a:lumMod val="99000"/>
+                <a:satMod val="120000"/>
+                <a:shade val="78000"/>
+              </a:schemeClr>
+            </a:gs>
+          </a:gsLst>
+          <a:lin ang="5400000" scaled="0"/>
+        </a:gradFill>
+      </a:fillStyleLst>
+      <a:lnStyleLst>
+        <a:ln w="6350" cap="flat" cmpd="sng" algn="ctr">
+          <a:solidFill>
+            <a:schemeClr val="phClr"/>
+          </a:solidFill>
+          <a:prstDash val="solid"/>
+          <a:miter lim="800000"/>
+        </a:ln>
+        <a:ln w="12700" cap="flat" cmpd="sng" algn="ctr">
+          <a:solidFill>
+            <a:schemeClr val="phClr"/>
+          </a:solidFill>
+          <a:prstDash val="solid"/>
+          <a:miter lim="800000"/>
+        </a:ln>
+        <a:ln w="19050" cap="flat" cmpd="sng" algn="ctr">
+          <a:solidFill>
+            <a:schemeClr val="phClr"/>
+          </a:solidFill>
+          <a:prstDash val="solid"/>
+          <a:miter lim="800000"/>
+        </a:ln>
+      </a:lnStyleLst>
+      <a:effectStyleLst>
+        <a:effectStyle>
+          <a:effectLst/>
+        </a:effectStyle>
+        <a:effectStyle>
+          <a:effectLst/>
+        </a:effectStyle>
+        <a:effectStyle>
+          <a:effectLst>
+            <a:outerShdw blurRad="57150" dist="19050" dir="5400000" algn="ctr" rotWithShape="0">
+              <a:srgbClr val="000000">
+                <a:alpha val="63000"/>
+              </a:srgbClr>
+            </a:outerShdw>
+          </a:effectLst>
+        </a:effectStyle>
+      </a:effectStyleLst>
+      <a:bgFillStyleLst>
+        <a:solidFill>
+          <a:schemeClr val="phClr"/>
+        </a:solidFill>
+        <a:solidFill>
+          <a:schemeClr val="phClr">
+            <a:tint val="95000"/>
+            <a:satMod val="170000"/>
+          </a:schemeClr>
+        </a:solidFill>
+        <a:gradFill rotWithShape="1">
+          <a:gsLst>
+            <a:gs pos="0">
+              <a:schemeClr val="phClr">
+                <a:tint val="93000"/>
+                <a:satMod val="150000"/>
+                <a:shade val="98000"/>
+                <a:lumMod val="102000"/>
+              </a:schemeClr>
+            </a:gs>
+            <a:gs pos="50000">
+              <a:schemeClr val="phClr">
+                <a:tint val="98000"/>
+                <a:satMod val="130000"/>
+                <a:shade val="90000"/>
+                <a:lumMod val="103000"/>
+              </a:schemeClr>
+            </a:gs>
+            <a:gs pos="100000">
+              <a:schemeClr val="phClr">
+                <a:shade val="63000"/>
+                <a:satMod val="120000"/>
+              </a:schemeClr>
+            </a:gs>
+          </a:gsLst>
+          <a:lin ang="5400000" scaled="0"/>
+        </a:gradFill>
+      </a:bgFillStyleLst>
+    </a:fmtScheme>
+  </a:themeElements>
+  <a:objectDefaults/>
+  <a:extraClrSchemeLst/>
+  <a:extLst>
+    <a:ext uri="{05A4C25C-085E-4340-85A3-A5531E510DB2}">
+      <thm15:themeFamily xmlns:thm15="http://schemas.microsoft.com/office/thememl/2012/main" name="Office Theme" id="{62F939B6-93AF-4DB8-9C6B-D6C7DFDC589F}" vid="{4A3C46E8-61CC-4603-A589-7422A47A8E4A}"/>
+    </a:ext>
+  </a:extLst>
+</a:theme>
 </file>
</xml_diff>

<commit_message>
add information about installation in the user guide
</commit_message>
<xml_diff>
--- a/Documentation/Présentation/Présentation.pptx
+++ b/Documentation/Présentation/Présentation.pptx
@@ -532,13 +532,26 @@
           <a:p>
             <a:r>
               <a:rPr lang="fr-CH" baseline="0" dirty="0"/>
-              <a:t>		Design pattern ??? (Je sais plus si on vraiment utilisé des pattern ou pas)</a:t>
-            </a:r>
-          </a:p>
-          <a:p>
+              <a:t>		Design pattern : </a:t>
+            </a:r>
+            <a:r>
+              <a:rPr lang="fr-CH" baseline="0" dirty="0" err="1"/>
+              <a:t>method</a:t>
+            </a:r>
             <a:r>
               <a:rPr lang="fr-CH" baseline="0" dirty="0"/>
-              <a:t>		</a:t>
+              <a:t> </a:t>
+            </a:r>
+            <a:r>
+              <a:rPr lang="fr-CH" baseline="0" dirty="0" err="1"/>
+              <a:t>template</a:t>
+            </a:r>
+            <a:endParaRPr lang="fr-CH" baseline="0" dirty="0"/>
+          </a:p>
+          <a:p>
+            <a:r>
+              <a:rPr lang="fr-CH" baseline="0" dirty="0"/>
+              <a:t>		Génie logiciel : utilisation concrète des différents diagramme </a:t>
             </a:r>
             <a:endParaRPr lang="fr-CH" dirty="0"/>
           </a:p>
@@ -713,7 +726,7 @@
           <a:p>
             <a:fld id="{C9004E96-C566-4F1F-BF51-157AB8E138C5}" type="datetimeFigureOut">
               <a:rPr lang="fr-CH" smtClean="0"/>
-              <a:t>13.07.2017</a:t>
+              <a:t>14.07.2017</a:t>
             </a:fld>
             <a:endParaRPr lang="fr-CH"/>
           </a:p>
@@ -883,7 +896,7 @@
           <a:p>
             <a:fld id="{C9004E96-C566-4F1F-BF51-157AB8E138C5}" type="datetimeFigureOut">
               <a:rPr lang="fr-CH" smtClean="0"/>
-              <a:t>13.07.2017</a:t>
+              <a:t>14.07.2017</a:t>
             </a:fld>
             <a:endParaRPr lang="fr-CH"/>
           </a:p>
@@ -1063,7 +1076,7 @@
           <a:p>
             <a:fld id="{C9004E96-C566-4F1F-BF51-157AB8E138C5}" type="datetimeFigureOut">
               <a:rPr lang="fr-CH" smtClean="0"/>
-              <a:t>13.07.2017</a:t>
+              <a:t>14.07.2017</a:t>
             </a:fld>
             <a:endParaRPr lang="fr-CH"/>
           </a:p>
@@ -1210,7 +1223,7 @@
           <a:p>
             <a:fld id="{C9004E96-C566-4F1F-BF51-157AB8E138C5}" type="datetimeFigureOut">
               <a:rPr lang="fr-CH" smtClean="0"/>
-              <a:t>13.07.2017</a:t>
+              <a:t>14.07.2017</a:t>
             </a:fld>
             <a:endParaRPr lang="fr-CH"/>
           </a:p>
@@ -1529,7 +1542,7 @@
           <a:p>
             <a:fld id="{C9004E96-C566-4F1F-BF51-157AB8E138C5}" type="datetimeFigureOut">
               <a:rPr lang="fr-CH" smtClean="0"/>
-              <a:t>13.07.2017</a:t>
+              <a:t>14.07.2017</a:t>
             </a:fld>
             <a:endParaRPr lang="fr-CH"/>
           </a:p>
@@ -1738,7 +1751,7 @@
           <a:p>
             <a:fld id="{C9004E96-C566-4F1F-BF51-157AB8E138C5}" type="datetimeFigureOut">
               <a:rPr lang="fr-CH" smtClean="0"/>
-              <a:t>13.07.2017</a:t>
+              <a:t>14.07.2017</a:t>
             </a:fld>
             <a:endParaRPr lang="fr-CH"/>
           </a:p>
@@ -2173,7 +2186,7 @@
           <a:p>
             <a:fld id="{C9004E96-C566-4F1F-BF51-157AB8E138C5}" type="datetimeFigureOut">
               <a:rPr lang="fr-CH" smtClean="0"/>
-              <a:t>13.07.2017</a:t>
+              <a:t>14.07.2017</a:t>
             </a:fld>
             <a:endParaRPr lang="fr-CH"/>
           </a:p>
@@ -2268,7 +2281,7 @@
           <a:p>
             <a:fld id="{C9004E96-C566-4F1F-BF51-157AB8E138C5}" type="datetimeFigureOut">
               <a:rPr lang="fr-CH" smtClean="0"/>
-              <a:t>13.07.2017</a:t>
+              <a:t>14.07.2017</a:t>
             </a:fld>
             <a:endParaRPr lang="fr-CH"/>
           </a:p>
@@ -2431,7 +2444,7 @@
           <a:p>
             <a:fld id="{C9004E96-C566-4F1F-BF51-157AB8E138C5}" type="datetimeFigureOut">
               <a:rPr lang="fr-CH" smtClean="0"/>
-              <a:t>13.07.2017</a:t>
+              <a:t>14.07.2017</a:t>
             </a:fld>
             <a:endParaRPr lang="fr-CH"/>
           </a:p>
@@ -2708,7 +2721,7 @@
           <a:p>
             <a:fld id="{C9004E96-C566-4F1F-BF51-157AB8E138C5}" type="datetimeFigureOut">
               <a:rPr lang="fr-CH" smtClean="0"/>
-              <a:t>13.07.2017</a:t>
+              <a:t>14.07.2017</a:t>
             </a:fld>
             <a:endParaRPr lang="fr-CH"/>
           </a:p>
@@ -2961,7 +2974,7 @@
           <a:p>
             <a:fld id="{C9004E96-C566-4F1F-BF51-157AB8E138C5}" type="datetimeFigureOut">
               <a:rPr lang="fr-CH" smtClean="0"/>
-              <a:t>13.07.2017</a:t>
+              <a:t>14.07.2017</a:t>
             </a:fld>
             <a:endParaRPr lang="fr-CH"/>
           </a:p>
@@ -3171,7 +3184,7 @@
           <a:p>
             <a:fld id="{C9004E96-C566-4F1F-BF51-157AB8E138C5}" type="datetimeFigureOut">
               <a:rPr lang="fr-CH" smtClean="0"/>
-              <a:t>13.07.2017</a:t>
+              <a:t>14.07.2017</a:t>
             </a:fld>
             <a:endParaRPr lang="fr-CH"/>
           </a:p>
@@ -5450,8 +5463,14 @@
             </a:r>
           </a:p>
           <a:p>
+            <a:pPr marL="0" indent="0">
+              <a:buNone/>
+            </a:pPr>
             <a:endParaRPr lang="fr-CH" dirty="0"/>
           </a:p>
+          <a:p>
+            <a:endParaRPr lang="fr-CH" dirty="0"/>
+          </a:p>
         </p:txBody>
       </p:sp>
       <p:sp>
@@ -5486,7 +5505,7 @@
         <p:spPr/>
         <p:txBody>
           <a:bodyPr>
-            <a:normAutofit/>
+            <a:normAutofit fontScale="90000"/>
           </a:bodyPr>
           <a:lstStyle/>
           <a:p>

</xml_diff>